<commit_message>
fix oc43 spike tree for community view
</commit_message>
<xml_diff>
--- a/figures/figure_components/figure1_supplement1.pptx
+++ b/figures/figure_components/figure1_supplement1.pptx
@@ -2,12 +2,12 @@
 <file path=ppt/presentation.xml><?xml version="1.0" encoding="utf-8"?>
 <p:presentation xmlns:a="http://schemas.openxmlformats.org/drawingml/2006/main" xmlns:r="http://schemas.openxmlformats.org/officeDocument/2006/relationships" xmlns:p="http://schemas.openxmlformats.org/presentationml/2006/main" saveSubsetFonts="1" autoCompressPictures="0">
   <p:sldMasterIdLst>
-    <p:sldMasterId id="2147483696" r:id="rId1"/>
+    <p:sldMasterId id="2147483720" r:id="rId1"/>
   </p:sldMasterIdLst>
   <p:sldIdLst>
     <p:sldId id="256" r:id="rId2"/>
   </p:sldIdLst>
-  <p:sldSz cx="6858000" cy="8686800"/>
+  <p:sldSz cx="8686800" cy="10058400"/>
   <p:notesSz cx="6858000" cy="9144000"/>
   <p:defaultTextStyle>
     <a:defPPr>
@@ -104,11 +104,6 @@
       </a:defRPr>
     </a:lvl9pPr>
   </p:defaultTextStyle>
-  <p:extLst>
-    <p:ext uri="{EFAFB233-063F-42B5-8137-9DF3F51BA10A}">
-      <p15:sldGuideLst xmlns:p15="http://schemas.microsoft.com/office/powerpoint/2012/main"/>
-    </p:ext>
-  </p:extLst>
 </p:presentation>
 </file>
 
@@ -141,15 +136,15 @@
         </p:nvSpPr>
         <p:spPr>
           <a:xfrm>
-            <a:off x="514350" y="1421660"/>
-            <a:ext cx="5829300" cy="3024293"/>
+            <a:off x="651510" y="1646133"/>
+            <a:ext cx="7383780" cy="3501813"/>
           </a:xfrm>
         </p:spPr>
         <p:txBody>
           <a:bodyPr anchor="b"/>
           <a:lstStyle>
             <a:lvl1pPr algn="ctr">
-              <a:defRPr sz="4500"/>
+              <a:defRPr sz="5700"/>
             </a:lvl1pPr>
           </a:lstStyle>
           <a:p>
@@ -173,8 +168,8 @@
         </p:nvSpPr>
         <p:spPr>
           <a:xfrm>
-            <a:off x="857250" y="4562581"/>
-            <a:ext cx="5143500" cy="2097299"/>
+            <a:off x="1085850" y="5282989"/>
+            <a:ext cx="6515100" cy="2428451"/>
           </a:xfrm>
         </p:spPr>
         <p:txBody>
@@ -182,39 +177,39 @@
           <a:lstStyle>
             <a:lvl1pPr marL="0" indent="0" algn="ctr">
               <a:buNone/>
-              <a:defRPr sz="1800"/>
+              <a:defRPr sz="2280"/>
             </a:lvl1pPr>
-            <a:lvl2pPr marL="342900" indent="0" algn="ctr">
-              <a:buNone/>
-              <a:defRPr sz="1500"/>
+            <a:lvl2pPr marL="434340" indent="0" algn="ctr">
+              <a:buNone/>
+              <a:defRPr sz="1900"/>
             </a:lvl2pPr>
-            <a:lvl3pPr marL="685800" indent="0" algn="ctr">
-              <a:buNone/>
-              <a:defRPr sz="1350"/>
+            <a:lvl3pPr marL="868680" indent="0" algn="ctr">
+              <a:buNone/>
+              <a:defRPr sz="1710"/>
             </a:lvl3pPr>
-            <a:lvl4pPr marL="1028700" indent="0" algn="ctr">
-              <a:buNone/>
-              <a:defRPr sz="1200"/>
+            <a:lvl4pPr marL="1303020" indent="0" algn="ctr">
+              <a:buNone/>
+              <a:defRPr sz="1520"/>
             </a:lvl4pPr>
-            <a:lvl5pPr marL="1371600" indent="0" algn="ctr">
-              <a:buNone/>
-              <a:defRPr sz="1200"/>
+            <a:lvl5pPr marL="1737360" indent="0" algn="ctr">
+              <a:buNone/>
+              <a:defRPr sz="1520"/>
             </a:lvl5pPr>
-            <a:lvl6pPr marL="1714500" indent="0" algn="ctr">
-              <a:buNone/>
-              <a:defRPr sz="1200"/>
+            <a:lvl6pPr marL="2171700" indent="0" algn="ctr">
+              <a:buNone/>
+              <a:defRPr sz="1520"/>
             </a:lvl6pPr>
-            <a:lvl7pPr marL="2057400" indent="0" algn="ctr">
-              <a:buNone/>
-              <a:defRPr sz="1200"/>
+            <a:lvl7pPr marL="2606040" indent="0" algn="ctr">
+              <a:buNone/>
+              <a:defRPr sz="1520"/>
             </a:lvl7pPr>
-            <a:lvl8pPr marL="2400300" indent="0" algn="ctr">
-              <a:buNone/>
-              <a:defRPr sz="1200"/>
+            <a:lvl8pPr marL="3040380" indent="0" algn="ctr">
+              <a:buNone/>
+              <a:defRPr sz="1520"/>
             </a:lvl8pPr>
-            <a:lvl9pPr marL="2743200" indent="0" algn="ctr">
-              <a:buNone/>
-              <a:defRPr sz="1200"/>
+            <a:lvl9pPr marL="3474720" indent="0" algn="ctr">
+              <a:buNone/>
+              <a:defRPr sz="1520"/>
             </a:lvl9pPr>
           </a:lstStyle>
           <a:p>
@@ -241,9 +236,9 @@
           <a:bodyPr/>
           <a:lstStyle/>
           <a:p>
-            <a:fld id="{1C4B6D6B-83EE-D74F-8188-C0271BF674A5}" type="datetimeFigureOut">
+            <a:fld id="{61F84706-1074-644D-A0C3-85088D8D0685}" type="datetimeFigureOut">
               <a:rPr lang="en-US" smtClean="0"/>
-              <a:t>10/9/20</a:t>
+              <a:t>9/11/20</a:t>
             </a:fld>
             <a:endParaRPr lang="en-US"/>
           </a:p>
@@ -283,7 +278,7 @@
           <a:bodyPr/>
           <a:lstStyle/>
           <a:p>
-            <a:fld id="{5CCD4F3A-CA1D-2540-BD95-E072104239A1}" type="slidenum">
+            <a:fld id="{F5178147-8671-DB41-A609-308054092C50}" type="slidenum">
               <a:rPr lang="en-US" smtClean="0"/>
               <a:t>‹#›</a:t>
             </a:fld>
@@ -294,7 +289,7 @@
     </p:spTree>
     <p:extLst>
       <p:ext uri="{BB962C8B-B14F-4D97-AF65-F5344CB8AC3E}">
-        <p14:creationId xmlns:p14="http://schemas.microsoft.com/office/powerpoint/2010/main" val="3440257917"/>
+        <p14:creationId xmlns:p14="http://schemas.microsoft.com/office/powerpoint/2010/main" val="745855502"/>
       </p:ext>
     </p:extLst>
   </p:cSld>
@@ -411,9 +406,9 @@
           <a:bodyPr/>
           <a:lstStyle/>
           <a:p>
-            <a:fld id="{1C4B6D6B-83EE-D74F-8188-C0271BF674A5}" type="datetimeFigureOut">
+            <a:fld id="{61F84706-1074-644D-A0C3-85088D8D0685}" type="datetimeFigureOut">
               <a:rPr lang="en-US" smtClean="0"/>
-              <a:t>10/9/20</a:t>
+              <a:t>9/11/20</a:t>
             </a:fld>
             <a:endParaRPr lang="en-US"/>
           </a:p>
@@ -453,7 +448,7 @@
           <a:bodyPr/>
           <a:lstStyle/>
           <a:p>
-            <a:fld id="{5CCD4F3A-CA1D-2540-BD95-E072104239A1}" type="slidenum">
+            <a:fld id="{F5178147-8671-DB41-A609-308054092C50}" type="slidenum">
               <a:rPr lang="en-US" smtClean="0"/>
               <a:t>‹#›</a:t>
             </a:fld>
@@ -464,7 +459,7 @@
     </p:spTree>
     <p:extLst>
       <p:ext uri="{BB962C8B-B14F-4D97-AF65-F5344CB8AC3E}">
-        <p14:creationId xmlns:p14="http://schemas.microsoft.com/office/powerpoint/2010/main" val="1741617666"/>
+        <p14:creationId xmlns:p14="http://schemas.microsoft.com/office/powerpoint/2010/main" val="925916311"/>
       </p:ext>
     </p:extLst>
   </p:cSld>
@@ -503,8 +498,8 @@
         </p:nvSpPr>
         <p:spPr>
           <a:xfrm>
-            <a:off x="4907757" y="462492"/>
-            <a:ext cx="1478756" cy="7361661"/>
+            <a:off x="6216492" y="535517"/>
+            <a:ext cx="1873091" cy="8524029"/>
           </a:xfrm>
         </p:spPr>
         <p:txBody>
@@ -531,8 +526,8 @@
         </p:nvSpPr>
         <p:spPr>
           <a:xfrm>
-            <a:off x="471488" y="462492"/>
-            <a:ext cx="4350544" cy="7361661"/>
+            <a:off x="597218" y="535517"/>
+            <a:ext cx="5510689" cy="8524029"/>
           </a:xfrm>
         </p:spPr>
         <p:txBody>
@@ -591,9 +586,9 @@
           <a:bodyPr/>
           <a:lstStyle/>
           <a:p>
-            <a:fld id="{1C4B6D6B-83EE-D74F-8188-C0271BF674A5}" type="datetimeFigureOut">
+            <a:fld id="{61F84706-1074-644D-A0C3-85088D8D0685}" type="datetimeFigureOut">
               <a:rPr lang="en-US" smtClean="0"/>
-              <a:t>10/9/20</a:t>
+              <a:t>9/11/20</a:t>
             </a:fld>
             <a:endParaRPr lang="en-US"/>
           </a:p>
@@ -633,7 +628,7 @@
           <a:bodyPr/>
           <a:lstStyle/>
           <a:p>
-            <a:fld id="{5CCD4F3A-CA1D-2540-BD95-E072104239A1}" type="slidenum">
+            <a:fld id="{F5178147-8671-DB41-A609-308054092C50}" type="slidenum">
               <a:rPr lang="en-US" smtClean="0"/>
               <a:t>‹#›</a:t>
             </a:fld>
@@ -644,7 +639,7 @@
     </p:spTree>
     <p:extLst>
       <p:ext uri="{BB962C8B-B14F-4D97-AF65-F5344CB8AC3E}">
-        <p14:creationId xmlns:p14="http://schemas.microsoft.com/office/powerpoint/2010/main" val="4174760958"/>
+        <p14:creationId xmlns:p14="http://schemas.microsoft.com/office/powerpoint/2010/main" val="1575355868"/>
       </p:ext>
     </p:extLst>
   </p:cSld>
@@ -761,9 +756,9 @@
           <a:bodyPr/>
           <a:lstStyle/>
           <a:p>
-            <a:fld id="{1C4B6D6B-83EE-D74F-8188-C0271BF674A5}" type="datetimeFigureOut">
+            <a:fld id="{61F84706-1074-644D-A0C3-85088D8D0685}" type="datetimeFigureOut">
               <a:rPr lang="en-US" smtClean="0"/>
-              <a:t>10/9/20</a:t>
+              <a:t>9/11/20</a:t>
             </a:fld>
             <a:endParaRPr lang="en-US"/>
           </a:p>
@@ -803,7 +798,7 @@
           <a:bodyPr/>
           <a:lstStyle/>
           <a:p>
-            <a:fld id="{5CCD4F3A-CA1D-2540-BD95-E072104239A1}" type="slidenum">
+            <a:fld id="{F5178147-8671-DB41-A609-308054092C50}" type="slidenum">
               <a:rPr lang="en-US" smtClean="0"/>
               <a:t>‹#›</a:t>
             </a:fld>
@@ -814,7 +809,7 @@
     </p:spTree>
     <p:extLst>
       <p:ext uri="{BB962C8B-B14F-4D97-AF65-F5344CB8AC3E}">
-        <p14:creationId xmlns:p14="http://schemas.microsoft.com/office/powerpoint/2010/main" val="1796015650"/>
+        <p14:creationId xmlns:p14="http://schemas.microsoft.com/office/powerpoint/2010/main" val="934050226"/>
       </p:ext>
     </p:extLst>
   </p:cSld>
@@ -853,15 +848,15 @@
         </p:nvSpPr>
         <p:spPr>
           <a:xfrm>
-            <a:off x="467916" y="2165670"/>
-            <a:ext cx="5915025" cy="3613467"/>
+            <a:off x="592694" y="2507618"/>
+            <a:ext cx="7492365" cy="4184014"/>
           </a:xfrm>
         </p:spPr>
         <p:txBody>
           <a:bodyPr anchor="b"/>
           <a:lstStyle>
             <a:lvl1pPr>
-              <a:defRPr sz="4500"/>
+              <a:defRPr sz="5700"/>
             </a:lvl1pPr>
           </a:lstStyle>
           <a:p>
@@ -885,8 +880,8 @@
         </p:nvSpPr>
         <p:spPr>
           <a:xfrm>
-            <a:off x="467916" y="5813322"/>
-            <a:ext cx="5915025" cy="1900237"/>
+            <a:off x="592694" y="6731215"/>
+            <a:ext cx="7492365" cy="2200274"/>
           </a:xfrm>
         </p:spPr>
         <p:txBody>
@@ -894,15 +889,15 @@
           <a:lstStyle>
             <a:lvl1pPr marL="0" indent="0">
               <a:buNone/>
-              <a:defRPr sz="1800">
+              <a:defRPr sz="2280">
                 <a:solidFill>
                   <a:schemeClr val="tx1"/>
                 </a:solidFill>
               </a:defRPr>
             </a:lvl1pPr>
-            <a:lvl2pPr marL="342900" indent="0">
-              <a:buNone/>
-              <a:defRPr sz="1500">
+            <a:lvl2pPr marL="434340" indent="0">
+              <a:buNone/>
+              <a:defRPr sz="1900">
                 <a:solidFill>
                   <a:schemeClr val="tx1">
                     <a:tint val="75000"/>
@@ -910,9 +905,9 @@
                 </a:solidFill>
               </a:defRPr>
             </a:lvl2pPr>
-            <a:lvl3pPr marL="685800" indent="0">
-              <a:buNone/>
-              <a:defRPr sz="1350">
+            <a:lvl3pPr marL="868680" indent="0">
+              <a:buNone/>
+              <a:defRPr sz="1710">
                 <a:solidFill>
                   <a:schemeClr val="tx1">
                     <a:tint val="75000"/>
@@ -920,9 +915,9 @@
                 </a:solidFill>
               </a:defRPr>
             </a:lvl3pPr>
-            <a:lvl4pPr marL="1028700" indent="0">
-              <a:buNone/>
-              <a:defRPr sz="1200">
+            <a:lvl4pPr marL="1303020" indent="0">
+              <a:buNone/>
+              <a:defRPr sz="1520">
                 <a:solidFill>
                   <a:schemeClr val="tx1">
                     <a:tint val="75000"/>
@@ -930,9 +925,9 @@
                 </a:solidFill>
               </a:defRPr>
             </a:lvl4pPr>
-            <a:lvl5pPr marL="1371600" indent="0">
-              <a:buNone/>
-              <a:defRPr sz="1200">
+            <a:lvl5pPr marL="1737360" indent="0">
+              <a:buNone/>
+              <a:defRPr sz="1520">
                 <a:solidFill>
                   <a:schemeClr val="tx1">
                     <a:tint val="75000"/>
@@ -940,9 +935,9 @@
                 </a:solidFill>
               </a:defRPr>
             </a:lvl5pPr>
-            <a:lvl6pPr marL="1714500" indent="0">
-              <a:buNone/>
-              <a:defRPr sz="1200">
+            <a:lvl6pPr marL="2171700" indent="0">
+              <a:buNone/>
+              <a:defRPr sz="1520">
                 <a:solidFill>
                   <a:schemeClr val="tx1">
                     <a:tint val="75000"/>
@@ -950,9 +945,9 @@
                 </a:solidFill>
               </a:defRPr>
             </a:lvl6pPr>
-            <a:lvl7pPr marL="2057400" indent="0">
-              <a:buNone/>
-              <a:defRPr sz="1200">
+            <a:lvl7pPr marL="2606040" indent="0">
+              <a:buNone/>
+              <a:defRPr sz="1520">
                 <a:solidFill>
                   <a:schemeClr val="tx1">
                     <a:tint val="75000"/>
@@ -960,9 +955,9 @@
                 </a:solidFill>
               </a:defRPr>
             </a:lvl7pPr>
-            <a:lvl8pPr marL="2400300" indent="0">
-              <a:buNone/>
-              <a:defRPr sz="1200">
+            <a:lvl8pPr marL="3040380" indent="0">
+              <a:buNone/>
+              <a:defRPr sz="1520">
                 <a:solidFill>
                   <a:schemeClr val="tx1">
                     <a:tint val="75000"/>
@@ -970,9 +965,9 @@
                 </a:solidFill>
               </a:defRPr>
             </a:lvl8pPr>
-            <a:lvl9pPr marL="2743200" indent="0">
-              <a:buNone/>
-              <a:defRPr sz="1200">
+            <a:lvl9pPr marL="3474720" indent="0">
+              <a:buNone/>
+              <a:defRPr sz="1520">
                 <a:solidFill>
                   <a:schemeClr val="tx1">
                     <a:tint val="75000"/>
@@ -1005,9 +1000,9 @@
           <a:bodyPr/>
           <a:lstStyle/>
           <a:p>
-            <a:fld id="{1C4B6D6B-83EE-D74F-8188-C0271BF674A5}" type="datetimeFigureOut">
+            <a:fld id="{61F84706-1074-644D-A0C3-85088D8D0685}" type="datetimeFigureOut">
               <a:rPr lang="en-US" smtClean="0"/>
-              <a:t>10/9/20</a:t>
+              <a:t>9/11/20</a:t>
             </a:fld>
             <a:endParaRPr lang="en-US"/>
           </a:p>
@@ -1047,7 +1042,7 @@
           <a:bodyPr/>
           <a:lstStyle/>
           <a:p>
-            <a:fld id="{5CCD4F3A-CA1D-2540-BD95-E072104239A1}" type="slidenum">
+            <a:fld id="{F5178147-8671-DB41-A609-308054092C50}" type="slidenum">
               <a:rPr lang="en-US" smtClean="0"/>
               <a:t>‹#›</a:t>
             </a:fld>
@@ -1058,7 +1053,7 @@
     </p:spTree>
     <p:extLst>
       <p:ext uri="{BB962C8B-B14F-4D97-AF65-F5344CB8AC3E}">
-        <p14:creationId xmlns:p14="http://schemas.microsoft.com/office/powerpoint/2010/main" val="1085536677"/>
+        <p14:creationId xmlns:p14="http://schemas.microsoft.com/office/powerpoint/2010/main" val="822891481"/>
       </p:ext>
     </p:extLst>
   </p:cSld>
@@ -1120,8 +1115,8 @@
         </p:nvSpPr>
         <p:spPr>
           <a:xfrm>
-            <a:off x="471488" y="2312458"/>
-            <a:ext cx="2914650" cy="5511695"/>
+            <a:off x="597218" y="2677584"/>
+            <a:ext cx="3691890" cy="6381962"/>
           </a:xfrm>
         </p:spPr>
         <p:txBody>
@@ -1177,8 +1172,8 @@
         </p:nvSpPr>
         <p:spPr>
           <a:xfrm>
-            <a:off x="3471863" y="2312458"/>
-            <a:ext cx="2914650" cy="5511695"/>
+            <a:off x="4397693" y="2677584"/>
+            <a:ext cx="3691890" cy="6381962"/>
           </a:xfrm>
         </p:spPr>
         <p:txBody>
@@ -1237,9 +1232,9 @@
           <a:bodyPr/>
           <a:lstStyle/>
           <a:p>
-            <a:fld id="{1C4B6D6B-83EE-D74F-8188-C0271BF674A5}" type="datetimeFigureOut">
+            <a:fld id="{61F84706-1074-644D-A0C3-85088D8D0685}" type="datetimeFigureOut">
               <a:rPr lang="en-US" smtClean="0"/>
-              <a:t>10/9/20</a:t>
+              <a:t>9/11/20</a:t>
             </a:fld>
             <a:endParaRPr lang="en-US"/>
           </a:p>
@@ -1279,7 +1274,7 @@
           <a:bodyPr/>
           <a:lstStyle/>
           <a:p>
-            <a:fld id="{5CCD4F3A-CA1D-2540-BD95-E072104239A1}" type="slidenum">
+            <a:fld id="{F5178147-8671-DB41-A609-308054092C50}" type="slidenum">
               <a:rPr lang="en-US" smtClean="0"/>
               <a:t>‹#›</a:t>
             </a:fld>
@@ -1290,7 +1285,7 @@
     </p:spTree>
     <p:extLst>
       <p:ext uri="{BB962C8B-B14F-4D97-AF65-F5344CB8AC3E}">
-        <p14:creationId xmlns:p14="http://schemas.microsoft.com/office/powerpoint/2010/main" val="250650140"/>
+        <p14:creationId xmlns:p14="http://schemas.microsoft.com/office/powerpoint/2010/main" val="2538610373"/>
       </p:ext>
     </p:extLst>
   </p:cSld>
@@ -1329,8 +1324,8 @@
         </p:nvSpPr>
         <p:spPr>
           <a:xfrm>
-            <a:off x="472381" y="462494"/>
-            <a:ext cx="5915025" cy="1679046"/>
+            <a:off x="598349" y="535519"/>
+            <a:ext cx="7492365" cy="1944159"/>
           </a:xfrm>
         </p:spPr>
         <p:txBody>
@@ -1357,8 +1352,8 @@
         </p:nvSpPr>
         <p:spPr>
           <a:xfrm>
-            <a:off x="472381" y="2129473"/>
-            <a:ext cx="2901255" cy="1043622"/>
+            <a:off x="598350" y="2465706"/>
+            <a:ext cx="3674923" cy="1208404"/>
           </a:xfrm>
         </p:spPr>
         <p:txBody>
@@ -1366,39 +1361,39 @@
           <a:lstStyle>
             <a:lvl1pPr marL="0" indent="0">
               <a:buNone/>
-              <a:defRPr sz="1800" b="1"/>
+              <a:defRPr sz="2280" b="1"/>
             </a:lvl1pPr>
-            <a:lvl2pPr marL="342900" indent="0">
-              <a:buNone/>
-              <a:defRPr sz="1500" b="1"/>
+            <a:lvl2pPr marL="434340" indent="0">
+              <a:buNone/>
+              <a:defRPr sz="1900" b="1"/>
             </a:lvl2pPr>
-            <a:lvl3pPr marL="685800" indent="0">
-              <a:buNone/>
-              <a:defRPr sz="1350" b="1"/>
+            <a:lvl3pPr marL="868680" indent="0">
+              <a:buNone/>
+              <a:defRPr sz="1710" b="1"/>
             </a:lvl3pPr>
-            <a:lvl4pPr marL="1028700" indent="0">
-              <a:buNone/>
-              <a:defRPr sz="1200" b="1"/>
+            <a:lvl4pPr marL="1303020" indent="0">
+              <a:buNone/>
+              <a:defRPr sz="1520" b="1"/>
             </a:lvl4pPr>
-            <a:lvl5pPr marL="1371600" indent="0">
-              <a:buNone/>
-              <a:defRPr sz="1200" b="1"/>
+            <a:lvl5pPr marL="1737360" indent="0">
+              <a:buNone/>
+              <a:defRPr sz="1520" b="1"/>
             </a:lvl5pPr>
-            <a:lvl6pPr marL="1714500" indent="0">
-              <a:buNone/>
-              <a:defRPr sz="1200" b="1"/>
+            <a:lvl6pPr marL="2171700" indent="0">
+              <a:buNone/>
+              <a:defRPr sz="1520" b="1"/>
             </a:lvl6pPr>
-            <a:lvl7pPr marL="2057400" indent="0">
-              <a:buNone/>
-              <a:defRPr sz="1200" b="1"/>
+            <a:lvl7pPr marL="2606040" indent="0">
+              <a:buNone/>
+              <a:defRPr sz="1520" b="1"/>
             </a:lvl7pPr>
-            <a:lvl8pPr marL="2400300" indent="0">
-              <a:buNone/>
-              <a:defRPr sz="1200" b="1"/>
+            <a:lvl8pPr marL="3040380" indent="0">
+              <a:buNone/>
+              <a:defRPr sz="1520" b="1"/>
             </a:lvl8pPr>
-            <a:lvl9pPr marL="2743200" indent="0">
-              <a:buNone/>
-              <a:defRPr sz="1200" b="1"/>
+            <a:lvl9pPr marL="3474720" indent="0">
+              <a:buNone/>
+              <a:defRPr sz="1520" b="1"/>
             </a:lvl9pPr>
           </a:lstStyle>
           <a:p>
@@ -1422,8 +1417,8 @@
         </p:nvSpPr>
         <p:spPr>
           <a:xfrm>
-            <a:off x="472381" y="3173095"/>
-            <a:ext cx="2901255" cy="4667145"/>
+            <a:off x="598350" y="3674110"/>
+            <a:ext cx="3674923" cy="5404062"/>
           </a:xfrm>
         </p:spPr>
         <p:txBody>
@@ -1479,8 +1474,8 @@
         </p:nvSpPr>
         <p:spPr>
           <a:xfrm>
-            <a:off x="3471863" y="2129473"/>
-            <a:ext cx="2915543" cy="1043622"/>
+            <a:off x="4397693" y="2465706"/>
+            <a:ext cx="3693021" cy="1208404"/>
           </a:xfrm>
         </p:spPr>
         <p:txBody>
@@ -1488,39 +1483,39 @@
           <a:lstStyle>
             <a:lvl1pPr marL="0" indent="0">
               <a:buNone/>
-              <a:defRPr sz="1800" b="1"/>
+              <a:defRPr sz="2280" b="1"/>
             </a:lvl1pPr>
-            <a:lvl2pPr marL="342900" indent="0">
-              <a:buNone/>
-              <a:defRPr sz="1500" b="1"/>
+            <a:lvl2pPr marL="434340" indent="0">
+              <a:buNone/>
+              <a:defRPr sz="1900" b="1"/>
             </a:lvl2pPr>
-            <a:lvl3pPr marL="685800" indent="0">
-              <a:buNone/>
-              <a:defRPr sz="1350" b="1"/>
+            <a:lvl3pPr marL="868680" indent="0">
+              <a:buNone/>
+              <a:defRPr sz="1710" b="1"/>
             </a:lvl3pPr>
-            <a:lvl4pPr marL="1028700" indent="0">
-              <a:buNone/>
-              <a:defRPr sz="1200" b="1"/>
+            <a:lvl4pPr marL="1303020" indent="0">
+              <a:buNone/>
+              <a:defRPr sz="1520" b="1"/>
             </a:lvl4pPr>
-            <a:lvl5pPr marL="1371600" indent="0">
-              <a:buNone/>
-              <a:defRPr sz="1200" b="1"/>
+            <a:lvl5pPr marL="1737360" indent="0">
+              <a:buNone/>
+              <a:defRPr sz="1520" b="1"/>
             </a:lvl5pPr>
-            <a:lvl6pPr marL="1714500" indent="0">
-              <a:buNone/>
-              <a:defRPr sz="1200" b="1"/>
+            <a:lvl6pPr marL="2171700" indent="0">
+              <a:buNone/>
+              <a:defRPr sz="1520" b="1"/>
             </a:lvl6pPr>
-            <a:lvl7pPr marL="2057400" indent="0">
-              <a:buNone/>
-              <a:defRPr sz="1200" b="1"/>
+            <a:lvl7pPr marL="2606040" indent="0">
+              <a:buNone/>
+              <a:defRPr sz="1520" b="1"/>
             </a:lvl7pPr>
-            <a:lvl8pPr marL="2400300" indent="0">
-              <a:buNone/>
-              <a:defRPr sz="1200" b="1"/>
+            <a:lvl8pPr marL="3040380" indent="0">
+              <a:buNone/>
+              <a:defRPr sz="1520" b="1"/>
             </a:lvl8pPr>
-            <a:lvl9pPr marL="2743200" indent="0">
-              <a:buNone/>
-              <a:defRPr sz="1200" b="1"/>
+            <a:lvl9pPr marL="3474720" indent="0">
+              <a:buNone/>
+              <a:defRPr sz="1520" b="1"/>
             </a:lvl9pPr>
           </a:lstStyle>
           <a:p>
@@ -1544,8 +1539,8 @@
         </p:nvSpPr>
         <p:spPr>
           <a:xfrm>
-            <a:off x="3471863" y="3173095"/>
-            <a:ext cx="2915543" cy="4667145"/>
+            <a:off x="4397693" y="3674110"/>
+            <a:ext cx="3693021" cy="5404062"/>
           </a:xfrm>
         </p:spPr>
         <p:txBody>
@@ -1604,9 +1599,9 @@
           <a:bodyPr/>
           <a:lstStyle/>
           <a:p>
-            <a:fld id="{1C4B6D6B-83EE-D74F-8188-C0271BF674A5}" type="datetimeFigureOut">
+            <a:fld id="{61F84706-1074-644D-A0C3-85088D8D0685}" type="datetimeFigureOut">
               <a:rPr lang="en-US" smtClean="0"/>
-              <a:t>10/9/20</a:t>
+              <a:t>9/11/20</a:t>
             </a:fld>
             <a:endParaRPr lang="en-US"/>
           </a:p>
@@ -1646,7 +1641,7 @@
           <a:bodyPr/>
           <a:lstStyle/>
           <a:p>
-            <a:fld id="{5CCD4F3A-CA1D-2540-BD95-E072104239A1}" type="slidenum">
+            <a:fld id="{F5178147-8671-DB41-A609-308054092C50}" type="slidenum">
               <a:rPr lang="en-US" smtClean="0"/>
               <a:t>‹#›</a:t>
             </a:fld>
@@ -1657,7 +1652,7 @@
     </p:spTree>
     <p:extLst>
       <p:ext uri="{BB962C8B-B14F-4D97-AF65-F5344CB8AC3E}">
-        <p14:creationId xmlns:p14="http://schemas.microsoft.com/office/powerpoint/2010/main" val="3347223836"/>
+        <p14:creationId xmlns:p14="http://schemas.microsoft.com/office/powerpoint/2010/main" val="273699431"/>
       </p:ext>
     </p:extLst>
   </p:cSld>
@@ -1722,9 +1717,9 @@
           <a:bodyPr/>
           <a:lstStyle/>
           <a:p>
-            <a:fld id="{1C4B6D6B-83EE-D74F-8188-C0271BF674A5}" type="datetimeFigureOut">
+            <a:fld id="{61F84706-1074-644D-A0C3-85088D8D0685}" type="datetimeFigureOut">
               <a:rPr lang="en-US" smtClean="0"/>
-              <a:t>10/9/20</a:t>
+              <a:t>9/11/20</a:t>
             </a:fld>
             <a:endParaRPr lang="en-US"/>
           </a:p>
@@ -1764,7 +1759,7 @@
           <a:bodyPr/>
           <a:lstStyle/>
           <a:p>
-            <a:fld id="{5CCD4F3A-CA1D-2540-BD95-E072104239A1}" type="slidenum">
+            <a:fld id="{F5178147-8671-DB41-A609-308054092C50}" type="slidenum">
               <a:rPr lang="en-US" smtClean="0"/>
               <a:t>‹#›</a:t>
             </a:fld>
@@ -1775,7 +1770,7 @@
     </p:spTree>
     <p:extLst>
       <p:ext uri="{BB962C8B-B14F-4D97-AF65-F5344CB8AC3E}">
-        <p14:creationId xmlns:p14="http://schemas.microsoft.com/office/powerpoint/2010/main" val="3747064075"/>
+        <p14:creationId xmlns:p14="http://schemas.microsoft.com/office/powerpoint/2010/main" val="1478532583"/>
       </p:ext>
     </p:extLst>
   </p:cSld>
@@ -1817,9 +1812,9 @@
           <a:bodyPr/>
           <a:lstStyle/>
           <a:p>
-            <a:fld id="{1C4B6D6B-83EE-D74F-8188-C0271BF674A5}" type="datetimeFigureOut">
+            <a:fld id="{61F84706-1074-644D-A0C3-85088D8D0685}" type="datetimeFigureOut">
               <a:rPr lang="en-US" smtClean="0"/>
-              <a:t>10/9/20</a:t>
+              <a:t>9/11/20</a:t>
             </a:fld>
             <a:endParaRPr lang="en-US"/>
           </a:p>
@@ -1859,7 +1854,7 @@
           <a:bodyPr/>
           <a:lstStyle/>
           <a:p>
-            <a:fld id="{5CCD4F3A-CA1D-2540-BD95-E072104239A1}" type="slidenum">
+            <a:fld id="{F5178147-8671-DB41-A609-308054092C50}" type="slidenum">
               <a:rPr lang="en-US" smtClean="0"/>
               <a:t>‹#›</a:t>
             </a:fld>
@@ -1870,7 +1865,7 @@
     </p:spTree>
     <p:extLst>
       <p:ext uri="{BB962C8B-B14F-4D97-AF65-F5344CB8AC3E}">
-        <p14:creationId xmlns:p14="http://schemas.microsoft.com/office/powerpoint/2010/main" val="679971293"/>
+        <p14:creationId xmlns:p14="http://schemas.microsoft.com/office/powerpoint/2010/main" val="3373314472"/>
       </p:ext>
     </p:extLst>
   </p:cSld>
@@ -1909,15 +1904,15 @@
         </p:nvSpPr>
         <p:spPr>
           <a:xfrm>
-            <a:off x="472381" y="579120"/>
-            <a:ext cx="2211884" cy="2026920"/>
+            <a:off x="598349" y="670560"/>
+            <a:ext cx="2801719" cy="2346960"/>
           </a:xfrm>
         </p:spPr>
         <p:txBody>
           <a:bodyPr anchor="b"/>
           <a:lstStyle>
             <a:lvl1pPr>
-              <a:defRPr sz="2400"/>
+              <a:defRPr sz="3040"/>
             </a:lvl1pPr>
           </a:lstStyle>
           <a:p>
@@ -1941,39 +1936,39 @@
         </p:nvSpPr>
         <p:spPr>
           <a:xfrm>
-            <a:off x="2915543" y="1250740"/>
-            <a:ext cx="3471863" cy="6173258"/>
+            <a:off x="3693021" y="1448226"/>
+            <a:ext cx="4397693" cy="7147983"/>
           </a:xfrm>
         </p:spPr>
         <p:txBody>
           <a:bodyPr/>
           <a:lstStyle>
             <a:lvl1pPr>
-              <a:defRPr sz="2400"/>
+              <a:defRPr sz="3040"/>
             </a:lvl1pPr>
             <a:lvl2pPr>
-              <a:defRPr sz="2100"/>
+              <a:defRPr sz="2660"/>
             </a:lvl2pPr>
             <a:lvl3pPr>
-              <a:defRPr sz="1800"/>
+              <a:defRPr sz="2280"/>
             </a:lvl3pPr>
             <a:lvl4pPr>
-              <a:defRPr sz="1500"/>
+              <a:defRPr sz="1900"/>
             </a:lvl4pPr>
             <a:lvl5pPr>
-              <a:defRPr sz="1500"/>
+              <a:defRPr sz="1900"/>
             </a:lvl5pPr>
             <a:lvl6pPr>
-              <a:defRPr sz="1500"/>
+              <a:defRPr sz="1900"/>
             </a:lvl6pPr>
             <a:lvl7pPr>
-              <a:defRPr sz="1500"/>
+              <a:defRPr sz="1900"/>
             </a:lvl7pPr>
             <a:lvl8pPr>
-              <a:defRPr sz="1500"/>
+              <a:defRPr sz="1900"/>
             </a:lvl8pPr>
             <a:lvl9pPr>
-              <a:defRPr sz="1500"/>
+              <a:defRPr sz="1900"/>
             </a:lvl9pPr>
           </a:lstStyle>
           <a:p>
@@ -2026,8 +2021,8 @@
         </p:nvSpPr>
         <p:spPr>
           <a:xfrm>
-            <a:off x="472381" y="2606040"/>
-            <a:ext cx="2211884" cy="4828011"/>
+            <a:off x="598349" y="3017520"/>
+            <a:ext cx="2801719" cy="5590329"/>
           </a:xfrm>
         </p:spPr>
         <p:txBody>
@@ -2035,39 +2030,39 @@
           <a:lstStyle>
             <a:lvl1pPr marL="0" indent="0">
               <a:buNone/>
-              <a:defRPr sz="1200"/>
+              <a:defRPr sz="1520"/>
             </a:lvl1pPr>
-            <a:lvl2pPr marL="342900" indent="0">
-              <a:buNone/>
-              <a:defRPr sz="1050"/>
+            <a:lvl2pPr marL="434340" indent="0">
+              <a:buNone/>
+              <a:defRPr sz="1330"/>
             </a:lvl2pPr>
-            <a:lvl3pPr marL="685800" indent="0">
-              <a:buNone/>
-              <a:defRPr sz="900"/>
+            <a:lvl3pPr marL="868680" indent="0">
+              <a:buNone/>
+              <a:defRPr sz="1140"/>
             </a:lvl3pPr>
-            <a:lvl4pPr marL="1028700" indent="0">
-              <a:buNone/>
-              <a:defRPr sz="750"/>
+            <a:lvl4pPr marL="1303020" indent="0">
+              <a:buNone/>
+              <a:defRPr sz="950"/>
             </a:lvl4pPr>
-            <a:lvl5pPr marL="1371600" indent="0">
-              <a:buNone/>
-              <a:defRPr sz="750"/>
+            <a:lvl5pPr marL="1737360" indent="0">
+              <a:buNone/>
+              <a:defRPr sz="950"/>
             </a:lvl5pPr>
-            <a:lvl6pPr marL="1714500" indent="0">
-              <a:buNone/>
-              <a:defRPr sz="750"/>
+            <a:lvl6pPr marL="2171700" indent="0">
+              <a:buNone/>
+              <a:defRPr sz="950"/>
             </a:lvl6pPr>
-            <a:lvl7pPr marL="2057400" indent="0">
-              <a:buNone/>
-              <a:defRPr sz="750"/>
+            <a:lvl7pPr marL="2606040" indent="0">
+              <a:buNone/>
+              <a:defRPr sz="950"/>
             </a:lvl7pPr>
-            <a:lvl8pPr marL="2400300" indent="0">
-              <a:buNone/>
-              <a:defRPr sz="750"/>
+            <a:lvl8pPr marL="3040380" indent="0">
+              <a:buNone/>
+              <a:defRPr sz="950"/>
             </a:lvl8pPr>
-            <a:lvl9pPr marL="2743200" indent="0">
-              <a:buNone/>
-              <a:defRPr sz="750"/>
+            <a:lvl9pPr marL="3474720" indent="0">
+              <a:buNone/>
+              <a:defRPr sz="950"/>
             </a:lvl9pPr>
           </a:lstStyle>
           <a:p>
@@ -2094,9 +2089,9 @@
           <a:bodyPr/>
           <a:lstStyle/>
           <a:p>
-            <a:fld id="{1C4B6D6B-83EE-D74F-8188-C0271BF674A5}" type="datetimeFigureOut">
+            <a:fld id="{61F84706-1074-644D-A0C3-85088D8D0685}" type="datetimeFigureOut">
               <a:rPr lang="en-US" smtClean="0"/>
-              <a:t>10/9/20</a:t>
+              <a:t>9/11/20</a:t>
             </a:fld>
             <a:endParaRPr lang="en-US"/>
           </a:p>
@@ -2136,7 +2131,7 @@
           <a:bodyPr/>
           <a:lstStyle/>
           <a:p>
-            <a:fld id="{5CCD4F3A-CA1D-2540-BD95-E072104239A1}" type="slidenum">
+            <a:fld id="{F5178147-8671-DB41-A609-308054092C50}" type="slidenum">
               <a:rPr lang="en-US" smtClean="0"/>
               <a:t>‹#›</a:t>
             </a:fld>
@@ -2147,7 +2142,7 @@
     </p:spTree>
     <p:extLst>
       <p:ext uri="{BB962C8B-B14F-4D97-AF65-F5344CB8AC3E}">
-        <p14:creationId xmlns:p14="http://schemas.microsoft.com/office/powerpoint/2010/main" val="3912335803"/>
+        <p14:creationId xmlns:p14="http://schemas.microsoft.com/office/powerpoint/2010/main" val="1861627827"/>
       </p:ext>
     </p:extLst>
   </p:cSld>
@@ -2186,15 +2181,15 @@
         </p:nvSpPr>
         <p:spPr>
           <a:xfrm>
-            <a:off x="472381" y="579120"/>
-            <a:ext cx="2211884" cy="2026920"/>
+            <a:off x="598349" y="670560"/>
+            <a:ext cx="2801719" cy="2346960"/>
           </a:xfrm>
         </p:spPr>
         <p:txBody>
           <a:bodyPr anchor="b"/>
           <a:lstStyle>
             <a:lvl1pPr>
-              <a:defRPr sz="2400"/>
+              <a:defRPr sz="3040"/>
             </a:lvl1pPr>
           </a:lstStyle>
           <a:p>
@@ -2218,8 +2213,8 @@
         </p:nvSpPr>
         <p:spPr>
           <a:xfrm>
-            <a:off x="2915543" y="1250740"/>
-            <a:ext cx="3471863" cy="6173258"/>
+            <a:off x="3693021" y="1448226"/>
+            <a:ext cx="4397693" cy="7147983"/>
           </a:xfrm>
         </p:spPr>
         <p:txBody>
@@ -2227,39 +2222,39 @@
           <a:lstStyle>
             <a:lvl1pPr marL="0" indent="0">
               <a:buNone/>
-              <a:defRPr sz="2400"/>
+              <a:defRPr sz="3040"/>
             </a:lvl1pPr>
-            <a:lvl2pPr marL="342900" indent="0">
-              <a:buNone/>
-              <a:defRPr sz="2100"/>
+            <a:lvl2pPr marL="434340" indent="0">
+              <a:buNone/>
+              <a:defRPr sz="2660"/>
             </a:lvl2pPr>
-            <a:lvl3pPr marL="685800" indent="0">
-              <a:buNone/>
-              <a:defRPr sz="1800"/>
+            <a:lvl3pPr marL="868680" indent="0">
+              <a:buNone/>
+              <a:defRPr sz="2280"/>
             </a:lvl3pPr>
-            <a:lvl4pPr marL="1028700" indent="0">
-              <a:buNone/>
-              <a:defRPr sz="1500"/>
+            <a:lvl4pPr marL="1303020" indent="0">
+              <a:buNone/>
+              <a:defRPr sz="1900"/>
             </a:lvl4pPr>
-            <a:lvl5pPr marL="1371600" indent="0">
-              <a:buNone/>
-              <a:defRPr sz="1500"/>
+            <a:lvl5pPr marL="1737360" indent="0">
+              <a:buNone/>
+              <a:defRPr sz="1900"/>
             </a:lvl5pPr>
-            <a:lvl6pPr marL="1714500" indent="0">
-              <a:buNone/>
-              <a:defRPr sz="1500"/>
+            <a:lvl6pPr marL="2171700" indent="0">
+              <a:buNone/>
+              <a:defRPr sz="1900"/>
             </a:lvl6pPr>
-            <a:lvl7pPr marL="2057400" indent="0">
-              <a:buNone/>
-              <a:defRPr sz="1500"/>
+            <a:lvl7pPr marL="2606040" indent="0">
+              <a:buNone/>
+              <a:defRPr sz="1900"/>
             </a:lvl7pPr>
-            <a:lvl8pPr marL="2400300" indent="0">
-              <a:buNone/>
-              <a:defRPr sz="1500"/>
+            <a:lvl8pPr marL="3040380" indent="0">
+              <a:buNone/>
+              <a:defRPr sz="1900"/>
             </a:lvl8pPr>
-            <a:lvl9pPr marL="2743200" indent="0">
-              <a:buNone/>
-              <a:defRPr sz="1500"/>
+            <a:lvl9pPr marL="3474720" indent="0">
+              <a:buNone/>
+              <a:defRPr sz="1900"/>
             </a:lvl9pPr>
           </a:lstStyle>
           <a:p>
@@ -2283,8 +2278,8 @@
         </p:nvSpPr>
         <p:spPr>
           <a:xfrm>
-            <a:off x="472381" y="2606040"/>
-            <a:ext cx="2211884" cy="4828011"/>
+            <a:off x="598349" y="3017520"/>
+            <a:ext cx="2801719" cy="5590329"/>
           </a:xfrm>
         </p:spPr>
         <p:txBody>
@@ -2292,39 +2287,39 @@
           <a:lstStyle>
             <a:lvl1pPr marL="0" indent="0">
               <a:buNone/>
-              <a:defRPr sz="1200"/>
+              <a:defRPr sz="1520"/>
             </a:lvl1pPr>
-            <a:lvl2pPr marL="342900" indent="0">
-              <a:buNone/>
-              <a:defRPr sz="1050"/>
+            <a:lvl2pPr marL="434340" indent="0">
+              <a:buNone/>
+              <a:defRPr sz="1330"/>
             </a:lvl2pPr>
-            <a:lvl3pPr marL="685800" indent="0">
-              <a:buNone/>
-              <a:defRPr sz="900"/>
+            <a:lvl3pPr marL="868680" indent="0">
+              <a:buNone/>
+              <a:defRPr sz="1140"/>
             </a:lvl3pPr>
-            <a:lvl4pPr marL="1028700" indent="0">
-              <a:buNone/>
-              <a:defRPr sz="750"/>
+            <a:lvl4pPr marL="1303020" indent="0">
+              <a:buNone/>
+              <a:defRPr sz="950"/>
             </a:lvl4pPr>
-            <a:lvl5pPr marL="1371600" indent="0">
-              <a:buNone/>
-              <a:defRPr sz="750"/>
+            <a:lvl5pPr marL="1737360" indent="0">
+              <a:buNone/>
+              <a:defRPr sz="950"/>
             </a:lvl5pPr>
-            <a:lvl6pPr marL="1714500" indent="0">
-              <a:buNone/>
-              <a:defRPr sz="750"/>
+            <a:lvl6pPr marL="2171700" indent="0">
+              <a:buNone/>
+              <a:defRPr sz="950"/>
             </a:lvl6pPr>
-            <a:lvl7pPr marL="2057400" indent="0">
-              <a:buNone/>
-              <a:defRPr sz="750"/>
+            <a:lvl7pPr marL="2606040" indent="0">
+              <a:buNone/>
+              <a:defRPr sz="950"/>
             </a:lvl7pPr>
-            <a:lvl8pPr marL="2400300" indent="0">
-              <a:buNone/>
-              <a:defRPr sz="750"/>
+            <a:lvl8pPr marL="3040380" indent="0">
+              <a:buNone/>
+              <a:defRPr sz="950"/>
             </a:lvl8pPr>
-            <a:lvl9pPr marL="2743200" indent="0">
-              <a:buNone/>
-              <a:defRPr sz="750"/>
+            <a:lvl9pPr marL="3474720" indent="0">
+              <a:buNone/>
+              <a:defRPr sz="950"/>
             </a:lvl9pPr>
           </a:lstStyle>
           <a:p>
@@ -2351,9 +2346,9 @@
           <a:bodyPr/>
           <a:lstStyle/>
           <a:p>
-            <a:fld id="{1C4B6D6B-83EE-D74F-8188-C0271BF674A5}" type="datetimeFigureOut">
+            <a:fld id="{61F84706-1074-644D-A0C3-85088D8D0685}" type="datetimeFigureOut">
               <a:rPr lang="en-US" smtClean="0"/>
-              <a:t>10/9/20</a:t>
+              <a:t>9/11/20</a:t>
             </a:fld>
             <a:endParaRPr lang="en-US"/>
           </a:p>
@@ -2393,7 +2388,7 @@
           <a:bodyPr/>
           <a:lstStyle/>
           <a:p>
-            <a:fld id="{5CCD4F3A-CA1D-2540-BD95-E072104239A1}" type="slidenum">
+            <a:fld id="{F5178147-8671-DB41-A609-308054092C50}" type="slidenum">
               <a:rPr lang="en-US" smtClean="0"/>
               <a:t>‹#›</a:t>
             </a:fld>
@@ -2404,7 +2399,7 @@
     </p:spTree>
     <p:extLst>
       <p:ext uri="{BB962C8B-B14F-4D97-AF65-F5344CB8AC3E}">
-        <p14:creationId xmlns:p14="http://schemas.microsoft.com/office/powerpoint/2010/main" val="2480491716"/>
+        <p14:creationId xmlns:p14="http://schemas.microsoft.com/office/powerpoint/2010/main" val="1971375875"/>
       </p:ext>
     </p:extLst>
   </p:cSld>
@@ -2448,8 +2443,8 @@
         </p:nvSpPr>
         <p:spPr>
           <a:xfrm>
-            <a:off x="471488" y="462494"/>
-            <a:ext cx="5915025" cy="1679046"/>
+            <a:off x="597218" y="535519"/>
+            <a:ext cx="7492365" cy="1944159"/>
           </a:xfrm>
           <a:prstGeom prst="rect">
             <a:avLst/>
@@ -2481,8 +2476,8 @@
         </p:nvSpPr>
         <p:spPr>
           <a:xfrm>
-            <a:off x="471488" y="2312458"/>
-            <a:ext cx="5915025" cy="5511695"/>
+            <a:off x="597218" y="2677584"/>
+            <a:ext cx="7492365" cy="6381962"/>
           </a:xfrm>
           <a:prstGeom prst="rect">
             <a:avLst/>
@@ -2543,8 +2538,8 @@
         </p:nvSpPr>
         <p:spPr>
           <a:xfrm>
-            <a:off x="471488" y="8051378"/>
-            <a:ext cx="1543050" cy="462492"/>
+            <a:off x="597218" y="9322649"/>
+            <a:ext cx="1954530" cy="535517"/>
           </a:xfrm>
           <a:prstGeom prst="rect">
             <a:avLst/>
@@ -2554,7 +2549,7 @@
           <a:bodyPr vert="horz" lIns="91440" tIns="45720" rIns="91440" bIns="45720" rtlCol="0" anchor="ctr"/>
           <a:lstStyle>
             <a:lvl1pPr algn="l">
-              <a:defRPr sz="900">
+              <a:defRPr sz="1140">
                 <a:solidFill>
                   <a:schemeClr val="tx1">
                     <a:tint val="75000"/>
@@ -2564,9 +2559,9 @@
             </a:lvl1pPr>
           </a:lstStyle>
           <a:p>
-            <a:fld id="{1C4B6D6B-83EE-D74F-8188-C0271BF674A5}" type="datetimeFigureOut">
+            <a:fld id="{61F84706-1074-644D-A0C3-85088D8D0685}" type="datetimeFigureOut">
               <a:rPr lang="en-US" smtClean="0"/>
-              <a:t>10/9/20</a:t>
+              <a:t>9/11/20</a:t>
             </a:fld>
             <a:endParaRPr lang="en-US"/>
           </a:p>
@@ -2584,8 +2579,8 @@
         </p:nvSpPr>
         <p:spPr>
           <a:xfrm>
-            <a:off x="2271713" y="8051378"/>
-            <a:ext cx="2314575" cy="462492"/>
+            <a:off x="2877503" y="9322649"/>
+            <a:ext cx="2931795" cy="535517"/>
           </a:xfrm>
           <a:prstGeom prst="rect">
             <a:avLst/>
@@ -2595,7 +2590,7 @@
           <a:bodyPr vert="horz" lIns="91440" tIns="45720" rIns="91440" bIns="45720" rtlCol="0" anchor="ctr"/>
           <a:lstStyle>
             <a:lvl1pPr algn="ctr">
-              <a:defRPr sz="900">
+              <a:defRPr sz="1140">
                 <a:solidFill>
                   <a:schemeClr val="tx1">
                     <a:tint val="75000"/>
@@ -2621,8 +2616,8 @@
         </p:nvSpPr>
         <p:spPr>
           <a:xfrm>
-            <a:off x="4843463" y="8051378"/>
-            <a:ext cx="1543050" cy="462492"/>
+            <a:off x="6135053" y="9322649"/>
+            <a:ext cx="1954530" cy="535517"/>
           </a:xfrm>
           <a:prstGeom prst="rect">
             <a:avLst/>
@@ -2632,7 +2627,7 @@
           <a:bodyPr vert="horz" lIns="91440" tIns="45720" rIns="91440" bIns="45720" rtlCol="0" anchor="ctr"/>
           <a:lstStyle>
             <a:lvl1pPr algn="r">
-              <a:defRPr sz="900">
+              <a:defRPr sz="1140">
                 <a:solidFill>
                   <a:schemeClr val="tx1">
                     <a:tint val="75000"/>
@@ -2642,7 +2637,7 @@
             </a:lvl1pPr>
           </a:lstStyle>
           <a:p>
-            <a:fld id="{5CCD4F3A-CA1D-2540-BD95-E072104239A1}" type="slidenum">
+            <a:fld id="{F5178147-8671-DB41-A609-308054092C50}" type="slidenum">
               <a:rPr lang="en-US" smtClean="0"/>
               <a:t>‹#›</a:t>
             </a:fld>
@@ -2653,27 +2648,27 @@
     </p:spTree>
     <p:extLst>
       <p:ext uri="{BB962C8B-B14F-4D97-AF65-F5344CB8AC3E}">
-        <p14:creationId xmlns:p14="http://schemas.microsoft.com/office/powerpoint/2010/main" val="1522751490"/>
+        <p14:creationId xmlns:p14="http://schemas.microsoft.com/office/powerpoint/2010/main" val="1388883017"/>
       </p:ext>
     </p:extLst>
   </p:cSld>
   <p:clrMap bg1="lt1" tx1="dk1" bg2="lt2" tx2="dk2" accent1="accent1" accent2="accent2" accent3="accent3" accent4="accent4" accent5="accent5" accent6="accent6" hlink="hlink" folHlink="folHlink"/>
   <p:sldLayoutIdLst>
-    <p:sldLayoutId id="2147483697" r:id="rId1"/>
-    <p:sldLayoutId id="2147483698" r:id="rId2"/>
-    <p:sldLayoutId id="2147483699" r:id="rId3"/>
-    <p:sldLayoutId id="2147483700" r:id="rId4"/>
-    <p:sldLayoutId id="2147483701" r:id="rId5"/>
-    <p:sldLayoutId id="2147483702" r:id="rId6"/>
-    <p:sldLayoutId id="2147483703" r:id="rId7"/>
-    <p:sldLayoutId id="2147483704" r:id="rId8"/>
-    <p:sldLayoutId id="2147483705" r:id="rId9"/>
-    <p:sldLayoutId id="2147483706" r:id="rId10"/>
-    <p:sldLayoutId id="2147483707" r:id="rId11"/>
+    <p:sldLayoutId id="2147483721" r:id="rId1"/>
+    <p:sldLayoutId id="2147483722" r:id="rId2"/>
+    <p:sldLayoutId id="2147483723" r:id="rId3"/>
+    <p:sldLayoutId id="2147483724" r:id="rId4"/>
+    <p:sldLayoutId id="2147483725" r:id="rId5"/>
+    <p:sldLayoutId id="2147483726" r:id="rId6"/>
+    <p:sldLayoutId id="2147483727" r:id="rId7"/>
+    <p:sldLayoutId id="2147483728" r:id="rId8"/>
+    <p:sldLayoutId id="2147483729" r:id="rId9"/>
+    <p:sldLayoutId id="2147483730" r:id="rId10"/>
+    <p:sldLayoutId id="2147483731" r:id="rId11"/>
   </p:sldLayoutIdLst>
   <p:txStyles>
     <p:titleStyle>
-      <a:lvl1pPr algn="l" defTabSz="685800" rtl="0" eaLnBrk="1" latinLnBrk="0" hangingPunct="1">
+      <a:lvl1pPr algn="l" defTabSz="868680" rtl="0" eaLnBrk="1" latinLnBrk="0" hangingPunct="1">
         <a:lnSpc>
           <a:spcPct val="90000"/>
         </a:lnSpc>
@@ -2681,7 +2676,7 @@
           <a:spcPct val="0"/>
         </a:spcBef>
         <a:buNone/>
-        <a:defRPr sz="3300" kern="1200">
+        <a:defRPr sz="4180" kern="1200">
           <a:solidFill>
             <a:schemeClr val="tx1"/>
           </a:solidFill>
@@ -2692,16 +2687,16 @@
       </a:lvl1pPr>
     </p:titleStyle>
     <p:bodyStyle>
-      <a:lvl1pPr marL="171450" indent="-171450" algn="l" defTabSz="685800" rtl="0" eaLnBrk="1" latinLnBrk="0" hangingPunct="1">
+      <a:lvl1pPr marL="217170" indent="-217170" algn="l" defTabSz="868680" rtl="0" eaLnBrk="1" latinLnBrk="0" hangingPunct="1">
         <a:lnSpc>
           <a:spcPct val="90000"/>
         </a:lnSpc>
         <a:spcBef>
-          <a:spcPts val="750"/>
+          <a:spcPts val="950"/>
         </a:spcBef>
         <a:buFont typeface="Arial" panose="020B0604020202020204" pitchFamily="34" charset="0"/>
         <a:buChar char="•"/>
-        <a:defRPr sz="2100" kern="1200">
+        <a:defRPr sz="2660" kern="1200">
           <a:solidFill>
             <a:schemeClr val="tx1"/>
           </a:solidFill>
@@ -2710,16 +2705,16 @@
           <a:cs typeface="+mn-cs"/>
         </a:defRPr>
       </a:lvl1pPr>
-      <a:lvl2pPr marL="514350" indent="-171450" algn="l" defTabSz="685800" rtl="0" eaLnBrk="1" latinLnBrk="0" hangingPunct="1">
+      <a:lvl2pPr marL="651510" indent="-217170" algn="l" defTabSz="868680" rtl="0" eaLnBrk="1" latinLnBrk="0" hangingPunct="1">
         <a:lnSpc>
           <a:spcPct val="90000"/>
         </a:lnSpc>
         <a:spcBef>
-          <a:spcPts val="375"/>
+          <a:spcPts val="475"/>
         </a:spcBef>
         <a:buFont typeface="Arial" panose="020B0604020202020204" pitchFamily="34" charset="0"/>
         <a:buChar char="•"/>
-        <a:defRPr sz="1800" kern="1200">
+        <a:defRPr sz="2280" kern="1200">
           <a:solidFill>
             <a:schemeClr val="tx1"/>
           </a:solidFill>
@@ -2728,16 +2723,16 @@
           <a:cs typeface="+mn-cs"/>
         </a:defRPr>
       </a:lvl2pPr>
-      <a:lvl3pPr marL="857250" indent="-171450" algn="l" defTabSz="685800" rtl="0" eaLnBrk="1" latinLnBrk="0" hangingPunct="1">
+      <a:lvl3pPr marL="1085850" indent="-217170" algn="l" defTabSz="868680" rtl="0" eaLnBrk="1" latinLnBrk="0" hangingPunct="1">
         <a:lnSpc>
           <a:spcPct val="90000"/>
         </a:lnSpc>
         <a:spcBef>
-          <a:spcPts val="375"/>
+          <a:spcPts val="475"/>
         </a:spcBef>
         <a:buFont typeface="Arial" panose="020B0604020202020204" pitchFamily="34" charset="0"/>
         <a:buChar char="•"/>
-        <a:defRPr sz="1500" kern="1200">
+        <a:defRPr sz="1900" kern="1200">
           <a:solidFill>
             <a:schemeClr val="tx1"/>
           </a:solidFill>
@@ -2746,16 +2741,16 @@
           <a:cs typeface="+mn-cs"/>
         </a:defRPr>
       </a:lvl3pPr>
-      <a:lvl4pPr marL="1200150" indent="-171450" algn="l" defTabSz="685800" rtl="0" eaLnBrk="1" latinLnBrk="0" hangingPunct="1">
+      <a:lvl4pPr marL="1520190" indent="-217170" algn="l" defTabSz="868680" rtl="0" eaLnBrk="1" latinLnBrk="0" hangingPunct="1">
         <a:lnSpc>
           <a:spcPct val="90000"/>
         </a:lnSpc>
         <a:spcBef>
-          <a:spcPts val="375"/>
+          <a:spcPts val="475"/>
         </a:spcBef>
         <a:buFont typeface="Arial" panose="020B0604020202020204" pitchFamily="34" charset="0"/>
         <a:buChar char="•"/>
-        <a:defRPr sz="1350" kern="1200">
+        <a:defRPr sz="1710" kern="1200">
           <a:solidFill>
             <a:schemeClr val="tx1"/>
           </a:solidFill>
@@ -2764,16 +2759,16 @@
           <a:cs typeface="+mn-cs"/>
         </a:defRPr>
       </a:lvl4pPr>
-      <a:lvl5pPr marL="1543050" indent="-171450" algn="l" defTabSz="685800" rtl="0" eaLnBrk="1" latinLnBrk="0" hangingPunct="1">
+      <a:lvl5pPr marL="1954530" indent="-217170" algn="l" defTabSz="868680" rtl="0" eaLnBrk="1" latinLnBrk="0" hangingPunct="1">
         <a:lnSpc>
           <a:spcPct val="90000"/>
         </a:lnSpc>
         <a:spcBef>
-          <a:spcPts val="375"/>
+          <a:spcPts val="475"/>
         </a:spcBef>
         <a:buFont typeface="Arial" panose="020B0604020202020204" pitchFamily="34" charset="0"/>
         <a:buChar char="•"/>
-        <a:defRPr sz="1350" kern="1200">
+        <a:defRPr sz="1710" kern="1200">
           <a:solidFill>
             <a:schemeClr val="tx1"/>
           </a:solidFill>
@@ -2782,16 +2777,16 @@
           <a:cs typeface="+mn-cs"/>
         </a:defRPr>
       </a:lvl5pPr>
-      <a:lvl6pPr marL="1885950" indent="-171450" algn="l" defTabSz="685800" rtl="0" eaLnBrk="1" latinLnBrk="0" hangingPunct="1">
+      <a:lvl6pPr marL="2388870" indent="-217170" algn="l" defTabSz="868680" rtl="0" eaLnBrk="1" latinLnBrk="0" hangingPunct="1">
         <a:lnSpc>
           <a:spcPct val="90000"/>
         </a:lnSpc>
         <a:spcBef>
-          <a:spcPts val="375"/>
+          <a:spcPts val="475"/>
         </a:spcBef>
         <a:buFont typeface="Arial" panose="020B0604020202020204" pitchFamily="34" charset="0"/>
         <a:buChar char="•"/>
-        <a:defRPr sz="1350" kern="1200">
+        <a:defRPr sz="1710" kern="1200">
           <a:solidFill>
             <a:schemeClr val="tx1"/>
           </a:solidFill>
@@ -2800,16 +2795,16 @@
           <a:cs typeface="+mn-cs"/>
         </a:defRPr>
       </a:lvl6pPr>
-      <a:lvl7pPr marL="2228850" indent="-171450" algn="l" defTabSz="685800" rtl="0" eaLnBrk="1" latinLnBrk="0" hangingPunct="1">
+      <a:lvl7pPr marL="2823210" indent="-217170" algn="l" defTabSz="868680" rtl="0" eaLnBrk="1" latinLnBrk="0" hangingPunct="1">
         <a:lnSpc>
           <a:spcPct val="90000"/>
         </a:lnSpc>
         <a:spcBef>
-          <a:spcPts val="375"/>
+          <a:spcPts val="475"/>
         </a:spcBef>
         <a:buFont typeface="Arial" panose="020B0604020202020204" pitchFamily="34" charset="0"/>
         <a:buChar char="•"/>
-        <a:defRPr sz="1350" kern="1200">
+        <a:defRPr sz="1710" kern="1200">
           <a:solidFill>
             <a:schemeClr val="tx1"/>
           </a:solidFill>
@@ -2818,16 +2813,16 @@
           <a:cs typeface="+mn-cs"/>
         </a:defRPr>
       </a:lvl7pPr>
-      <a:lvl8pPr marL="2571750" indent="-171450" algn="l" defTabSz="685800" rtl="0" eaLnBrk="1" latinLnBrk="0" hangingPunct="1">
+      <a:lvl8pPr marL="3257550" indent="-217170" algn="l" defTabSz="868680" rtl="0" eaLnBrk="1" latinLnBrk="0" hangingPunct="1">
         <a:lnSpc>
           <a:spcPct val="90000"/>
         </a:lnSpc>
         <a:spcBef>
-          <a:spcPts val="375"/>
+          <a:spcPts val="475"/>
         </a:spcBef>
         <a:buFont typeface="Arial" panose="020B0604020202020204" pitchFamily="34" charset="0"/>
         <a:buChar char="•"/>
-        <a:defRPr sz="1350" kern="1200">
+        <a:defRPr sz="1710" kern="1200">
           <a:solidFill>
             <a:schemeClr val="tx1"/>
           </a:solidFill>
@@ -2836,16 +2831,16 @@
           <a:cs typeface="+mn-cs"/>
         </a:defRPr>
       </a:lvl8pPr>
-      <a:lvl9pPr marL="2914650" indent="-171450" algn="l" defTabSz="685800" rtl="0" eaLnBrk="1" latinLnBrk="0" hangingPunct="1">
+      <a:lvl9pPr marL="3691890" indent="-217170" algn="l" defTabSz="868680" rtl="0" eaLnBrk="1" latinLnBrk="0" hangingPunct="1">
         <a:lnSpc>
           <a:spcPct val="90000"/>
         </a:lnSpc>
         <a:spcBef>
-          <a:spcPts val="375"/>
+          <a:spcPts val="475"/>
         </a:spcBef>
         <a:buFont typeface="Arial" panose="020B0604020202020204" pitchFamily="34" charset="0"/>
         <a:buChar char="•"/>
-        <a:defRPr sz="1350" kern="1200">
+        <a:defRPr sz="1710" kern="1200">
           <a:solidFill>
             <a:schemeClr val="tx1"/>
           </a:solidFill>
@@ -2859,8 +2854,8 @@
       <a:defPPr>
         <a:defRPr lang="en-US"/>
       </a:defPPr>
-      <a:lvl1pPr marL="0" algn="l" defTabSz="685800" rtl="0" eaLnBrk="1" latinLnBrk="0" hangingPunct="1">
-        <a:defRPr sz="1350" kern="1200">
+      <a:lvl1pPr marL="0" algn="l" defTabSz="868680" rtl="0" eaLnBrk="1" latinLnBrk="0" hangingPunct="1">
+        <a:defRPr sz="1710" kern="1200">
           <a:solidFill>
             <a:schemeClr val="tx1"/>
           </a:solidFill>
@@ -2869,8 +2864,8 @@
           <a:cs typeface="+mn-cs"/>
         </a:defRPr>
       </a:lvl1pPr>
-      <a:lvl2pPr marL="342900" algn="l" defTabSz="685800" rtl="0" eaLnBrk="1" latinLnBrk="0" hangingPunct="1">
-        <a:defRPr sz="1350" kern="1200">
+      <a:lvl2pPr marL="434340" algn="l" defTabSz="868680" rtl="0" eaLnBrk="1" latinLnBrk="0" hangingPunct="1">
+        <a:defRPr sz="1710" kern="1200">
           <a:solidFill>
             <a:schemeClr val="tx1"/>
           </a:solidFill>
@@ -2879,8 +2874,8 @@
           <a:cs typeface="+mn-cs"/>
         </a:defRPr>
       </a:lvl2pPr>
-      <a:lvl3pPr marL="685800" algn="l" defTabSz="685800" rtl="0" eaLnBrk="1" latinLnBrk="0" hangingPunct="1">
-        <a:defRPr sz="1350" kern="1200">
+      <a:lvl3pPr marL="868680" algn="l" defTabSz="868680" rtl="0" eaLnBrk="1" latinLnBrk="0" hangingPunct="1">
+        <a:defRPr sz="1710" kern="1200">
           <a:solidFill>
             <a:schemeClr val="tx1"/>
           </a:solidFill>
@@ -2889,8 +2884,8 @@
           <a:cs typeface="+mn-cs"/>
         </a:defRPr>
       </a:lvl3pPr>
-      <a:lvl4pPr marL="1028700" algn="l" defTabSz="685800" rtl="0" eaLnBrk="1" latinLnBrk="0" hangingPunct="1">
-        <a:defRPr sz="1350" kern="1200">
+      <a:lvl4pPr marL="1303020" algn="l" defTabSz="868680" rtl="0" eaLnBrk="1" latinLnBrk="0" hangingPunct="1">
+        <a:defRPr sz="1710" kern="1200">
           <a:solidFill>
             <a:schemeClr val="tx1"/>
           </a:solidFill>
@@ -2899,8 +2894,8 @@
           <a:cs typeface="+mn-cs"/>
         </a:defRPr>
       </a:lvl4pPr>
-      <a:lvl5pPr marL="1371600" algn="l" defTabSz="685800" rtl="0" eaLnBrk="1" latinLnBrk="0" hangingPunct="1">
-        <a:defRPr sz="1350" kern="1200">
+      <a:lvl5pPr marL="1737360" algn="l" defTabSz="868680" rtl="0" eaLnBrk="1" latinLnBrk="0" hangingPunct="1">
+        <a:defRPr sz="1710" kern="1200">
           <a:solidFill>
             <a:schemeClr val="tx1"/>
           </a:solidFill>
@@ -2909,8 +2904,8 @@
           <a:cs typeface="+mn-cs"/>
         </a:defRPr>
       </a:lvl5pPr>
-      <a:lvl6pPr marL="1714500" algn="l" defTabSz="685800" rtl="0" eaLnBrk="1" latinLnBrk="0" hangingPunct="1">
-        <a:defRPr sz="1350" kern="1200">
+      <a:lvl6pPr marL="2171700" algn="l" defTabSz="868680" rtl="0" eaLnBrk="1" latinLnBrk="0" hangingPunct="1">
+        <a:defRPr sz="1710" kern="1200">
           <a:solidFill>
             <a:schemeClr val="tx1"/>
           </a:solidFill>
@@ -2919,8 +2914,8 @@
           <a:cs typeface="+mn-cs"/>
         </a:defRPr>
       </a:lvl6pPr>
-      <a:lvl7pPr marL="2057400" algn="l" defTabSz="685800" rtl="0" eaLnBrk="1" latinLnBrk="0" hangingPunct="1">
-        <a:defRPr sz="1350" kern="1200">
+      <a:lvl7pPr marL="2606040" algn="l" defTabSz="868680" rtl="0" eaLnBrk="1" latinLnBrk="0" hangingPunct="1">
+        <a:defRPr sz="1710" kern="1200">
           <a:solidFill>
             <a:schemeClr val="tx1"/>
           </a:solidFill>
@@ -2929,8 +2924,8 @@
           <a:cs typeface="+mn-cs"/>
         </a:defRPr>
       </a:lvl7pPr>
-      <a:lvl8pPr marL="2400300" algn="l" defTabSz="685800" rtl="0" eaLnBrk="1" latinLnBrk="0" hangingPunct="1">
-        <a:defRPr sz="1350" kern="1200">
+      <a:lvl8pPr marL="3040380" algn="l" defTabSz="868680" rtl="0" eaLnBrk="1" latinLnBrk="0" hangingPunct="1">
+        <a:defRPr sz="1710" kern="1200">
           <a:solidFill>
             <a:schemeClr val="tx1"/>
           </a:solidFill>
@@ -2939,8 +2934,8 @@
           <a:cs typeface="+mn-cs"/>
         </a:defRPr>
       </a:lvl8pPr>
-      <a:lvl9pPr marL="2743200" algn="l" defTabSz="685800" rtl="0" eaLnBrk="1" latinLnBrk="0" hangingPunct="1">
-        <a:defRPr sz="1350" kern="1200">
+      <a:lvl9pPr marL="3474720" algn="l" defTabSz="868680" rtl="0" eaLnBrk="1" latinLnBrk="0" hangingPunct="1">
+        <a:defRPr sz="1710" kern="1200">
           <a:solidFill>
             <a:schemeClr val="tx1"/>
           </a:solidFill>
@@ -2971,255 +2966,12 @@
           <a:chExt cx="0" cy="0"/>
         </a:xfrm>
       </p:grpSpPr>
-      <p:pic>
-        <p:nvPicPr>
-          <p:cNvPr id="6" name="Picture 5">
+      <p:grpSp>
+        <p:nvGrpSpPr>
+          <p:cNvPr id="15" name="Group 14">
             <a:extLst>
               <a:ext uri="{FF2B5EF4-FFF2-40B4-BE49-F238E27FC236}">
-                <a16:creationId xmlns:a16="http://schemas.microsoft.com/office/drawing/2014/main" id="{540400C8-D0E5-D049-99A6-7B8B042D991D}"/>
-              </a:ext>
-            </a:extLst>
-          </p:cNvPr>
-          <p:cNvPicPr>
-            <a:picLocks noChangeAspect="1"/>
-          </p:cNvPicPr>
-          <p:nvPr/>
-        </p:nvPicPr>
-        <p:blipFill rotWithShape="1">
-          <a:blip r:embed="rId2"/>
-          <a:srcRect l="5072" r="9726"/>
-          <a:stretch/>
-        </p:blipFill>
-        <p:spPr>
-          <a:xfrm>
-            <a:off x="695637" y="82672"/>
-            <a:ext cx="5843186" cy="5715000"/>
-          </a:xfrm>
-          <a:prstGeom prst="rect">
-            <a:avLst/>
-          </a:prstGeom>
-        </p:spPr>
-      </p:pic>
-      <p:pic>
-        <p:nvPicPr>
-          <p:cNvPr id="3" name="Picture 2">
-            <a:extLst>
-              <a:ext uri="{FF2B5EF4-FFF2-40B4-BE49-F238E27FC236}">
-                <a16:creationId xmlns:a16="http://schemas.microsoft.com/office/drawing/2014/main" id="{80347590-C9B8-B64C-A860-7E9EC128BD8F}"/>
-              </a:ext>
-            </a:extLst>
-          </p:cNvPr>
-          <p:cNvPicPr>
-            <a:picLocks noChangeAspect="1"/>
-          </p:cNvPicPr>
-          <p:nvPr/>
-        </p:nvPicPr>
-        <p:blipFill rotWithShape="1">
-          <a:blip r:embed="rId3"/>
-          <a:srcRect l="5072" t="49726" r="9726"/>
-          <a:stretch/>
-        </p:blipFill>
-        <p:spPr>
-          <a:xfrm>
-            <a:off x="695637" y="5659743"/>
-            <a:ext cx="5843186" cy="2873168"/>
-          </a:xfrm>
-          <a:prstGeom prst="rect">
-            <a:avLst/>
-          </a:prstGeom>
-        </p:spPr>
-      </p:pic>
-      <p:sp>
-        <p:nvSpPr>
-          <p:cNvPr id="7" name="Rectangle 6">
-            <a:extLst>
-              <a:ext uri="{FF2B5EF4-FFF2-40B4-BE49-F238E27FC236}">
-                <a16:creationId xmlns:a16="http://schemas.microsoft.com/office/drawing/2014/main" id="{709807DC-6BD1-A347-A958-1EB5CAEB3516}"/>
-              </a:ext>
-            </a:extLst>
-          </p:cNvPr>
-          <p:cNvSpPr/>
-          <p:nvPr/>
-        </p:nvSpPr>
-        <p:spPr>
-          <a:xfrm rot="16200000">
-            <a:off x="-874620" y="4105733"/>
-            <a:ext cx="2752677" cy="307777"/>
-          </a:xfrm>
-          <a:prstGeom prst="rect">
-            <a:avLst/>
-          </a:prstGeom>
-        </p:spPr>
-        <p:txBody>
-          <a:bodyPr wrap="none">
-            <a:spAutoFit/>
-          </a:bodyPr>
-          <a:lstStyle/>
-          <a:p>
-            <a:r>
-              <a:rPr lang="en-US" sz="1400" dirty="0">
-                <a:latin typeface="Arial" panose="020B0604020202020204" pitchFamily="34" charset="0"/>
-                <a:cs typeface="Arial" panose="020B0604020202020204" pitchFamily="34" charset="0"/>
-              </a:rPr>
-              <a:t>Amino acid substitutions per site</a:t>
-            </a:r>
-          </a:p>
-        </p:txBody>
-      </p:sp>
-      <p:sp>
-        <p:nvSpPr>
-          <p:cNvPr id="10" name="Rectangle 9">
-            <a:extLst>
-              <a:ext uri="{FF2B5EF4-FFF2-40B4-BE49-F238E27FC236}">
-                <a16:creationId xmlns:a16="http://schemas.microsoft.com/office/drawing/2014/main" id="{9F4D052C-8B31-9047-95E1-FE186F879458}"/>
-              </a:ext>
-            </a:extLst>
-          </p:cNvPr>
-          <p:cNvSpPr/>
-          <p:nvPr/>
-        </p:nvSpPr>
-        <p:spPr>
-          <a:xfrm>
-            <a:off x="2712879" y="8340923"/>
-            <a:ext cx="2215671" cy="307777"/>
-          </a:xfrm>
-          <a:prstGeom prst="rect">
-            <a:avLst/>
-          </a:prstGeom>
-        </p:spPr>
-        <p:txBody>
-          <a:bodyPr wrap="none">
-            <a:spAutoFit/>
-          </a:bodyPr>
-          <a:lstStyle/>
-          <a:p>
-            <a:r>
-              <a:rPr lang="en-US" sz="1400" dirty="0">
-                <a:latin typeface="Arial" panose="020B0604020202020204" pitchFamily="34" charset="0"/>
-                <a:cs typeface="Arial" panose="020B0604020202020204" pitchFamily="34" charset="0"/>
-              </a:rPr>
-              <a:t>Spike amino acid position</a:t>
-            </a:r>
-          </a:p>
-        </p:txBody>
-      </p:sp>
-      <p:sp>
-        <p:nvSpPr>
-          <p:cNvPr id="12" name="Rectangle 11">
-            <a:extLst>
-              <a:ext uri="{FF2B5EF4-FFF2-40B4-BE49-F238E27FC236}">
-                <a16:creationId xmlns:a16="http://schemas.microsoft.com/office/drawing/2014/main" id="{286CED00-56A6-EF41-A7D3-3734A8416807}"/>
-              </a:ext>
-            </a:extLst>
-          </p:cNvPr>
-          <p:cNvSpPr/>
-          <p:nvPr/>
-        </p:nvSpPr>
-        <p:spPr>
-          <a:xfrm>
-            <a:off x="15127" y="18223"/>
-            <a:ext cx="389850" cy="461665"/>
-          </a:xfrm>
-          <a:prstGeom prst="rect">
-            <a:avLst/>
-          </a:prstGeom>
-        </p:spPr>
-        <p:txBody>
-          <a:bodyPr wrap="none">
-            <a:spAutoFit/>
-          </a:bodyPr>
-          <a:lstStyle/>
-          <a:p>
-            <a:r>
-              <a:rPr lang="en-US" sz="2400" dirty="0">
-                <a:latin typeface="Arial" panose="020B0604020202020204" pitchFamily="34" charset="0"/>
-                <a:cs typeface="Arial" panose="020B0604020202020204" pitchFamily="34" charset="0"/>
-              </a:rPr>
-              <a:t>A</a:t>
-            </a:r>
-          </a:p>
-        </p:txBody>
-      </p:sp>
-      <p:sp>
-        <p:nvSpPr>
-          <p:cNvPr id="13" name="Rectangle 12">
-            <a:extLst>
-              <a:ext uri="{FF2B5EF4-FFF2-40B4-BE49-F238E27FC236}">
-                <a16:creationId xmlns:a16="http://schemas.microsoft.com/office/drawing/2014/main" id="{8D9EF1C4-2EB1-4945-A7F3-B7B3187AE95A}"/>
-              </a:ext>
-            </a:extLst>
-          </p:cNvPr>
-          <p:cNvSpPr/>
-          <p:nvPr/>
-        </p:nvSpPr>
-        <p:spPr>
-          <a:xfrm>
-            <a:off x="15127" y="2803792"/>
-            <a:ext cx="389850" cy="461665"/>
-          </a:xfrm>
-          <a:prstGeom prst="rect">
-            <a:avLst/>
-          </a:prstGeom>
-        </p:spPr>
-        <p:txBody>
-          <a:bodyPr wrap="none">
-            <a:spAutoFit/>
-          </a:bodyPr>
-          <a:lstStyle/>
-          <a:p>
-            <a:r>
-              <a:rPr lang="en-US" sz="2400" dirty="0">
-                <a:latin typeface="Arial" panose="020B0604020202020204" pitchFamily="34" charset="0"/>
-                <a:cs typeface="Arial" panose="020B0604020202020204" pitchFamily="34" charset="0"/>
-              </a:rPr>
-              <a:t>B</a:t>
-            </a:r>
-          </a:p>
-        </p:txBody>
-      </p:sp>
-      <p:sp>
-        <p:nvSpPr>
-          <p:cNvPr id="14" name="Rectangle 13">
-            <a:extLst>
-              <a:ext uri="{FF2B5EF4-FFF2-40B4-BE49-F238E27FC236}">
-                <a16:creationId xmlns:a16="http://schemas.microsoft.com/office/drawing/2014/main" id="{0AC506F8-7439-EC48-9DE1-D14B8F9B0B44}"/>
-              </a:ext>
-            </a:extLst>
-          </p:cNvPr>
-          <p:cNvSpPr/>
-          <p:nvPr/>
-        </p:nvSpPr>
-        <p:spPr>
-          <a:xfrm>
-            <a:off x="15127" y="5752357"/>
-            <a:ext cx="407484" cy="461665"/>
-          </a:xfrm>
-          <a:prstGeom prst="rect">
-            <a:avLst/>
-          </a:prstGeom>
-        </p:spPr>
-        <p:txBody>
-          <a:bodyPr wrap="none">
-            <a:spAutoFit/>
-          </a:bodyPr>
-          <a:lstStyle/>
-          <a:p>
-            <a:r>
-              <a:rPr lang="en-US" sz="2400" dirty="0">
-                <a:latin typeface="Arial" panose="020B0604020202020204" pitchFamily="34" charset="0"/>
-                <a:cs typeface="Arial" panose="020B0604020202020204" pitchFamily="34" charset="0"/>
-              </a:rPr>
-              <a:t>C</a:t>
-            </a:r>
-          </a:p>
-        </p:txBody>
-      </p:sp>
-      <p:grpSp>
-        <p:nvGrpSpPr>
-          <p:cNvPr id="19" name="Group 18">
-            <a:extLst>
-              <a:ext uri="{FF2B5EF4-FFF2-40B4-BE49-F238E27FC236}">
-                <a16:creationId xmlns:a16="http://schemas.microsoft.com/office/drawing/2014/main" id="{581BE497-D867-E24B-BB68-62D0BA8D747A}"/>
+                <a16:creationId xmlns:a16="http://schemas.microsoft.com/office/drawing/2014/main" id="{DACBB091-516C-134E-9E66-4F97C399DED7}"/>
               </a:ext>
             </a:extLst>
           </p:cNvPr>
@@ -3228,18 +2980,494 @@
         </p:nvGrpSpPr>
         <p:grpSpPr>
           <a:xfrm>
-            <a:off x="5711688" y="5890856"/>
-            <a:ext cx="1030603" cy="646331"/>
-            <a:chOff x="5741217" y="3085741"/>
-            <a:chExt cx="1030603" cy="646331"/>
+            <a:off x="228603" y="92095"/>
+            <a:ext cx="8294915" cy="4687004"/>
+            <a:chOff x="228602" y="84219"/>
+            <a:chExt cx="8294915" cy="4687004"/>
+          </a:xfrm>
+        </p:grpSpPr>
+        <p:grpSp>
+          <p:nvGrpSpPr>
+            <p:cNvPr id="12" name="Group 11">
+              <a:extLst>
+                <a:ext uri="{FF2B5EF4-FFF2-40B4-BE49-F238E27FC236}">
+                  <a16:creationId xmlns:a16="http://schemas.microsoft.com/office/drawing/2014/main" id="{088E24AF-2013-6149-AB52-6D5F7F9E11A8}"/>
+                </a:ext>
+              </a:extLst>
+            </p:cNvPr>
+            <p:cNvGrpSpPr/>
+            <p:nvPr/>
+          </p:nvGrpSpPr>
+          <p:grpSpPr>
+            <a:xfrm>
+              <a:off x="228602" y="84219"/>
+              <a:ext cx="8294915" cy="4468731"/>
+              <a:chOff x="228602" y="84219"/>
+              <a:chExt cx="8294915" cy="4468731"/>
+            </a:xfrm>
+          </p:grpSpPr>
+          <p:pic>
+            <p:nvPicPr>
+              <p:cNvPr id="5" name="Picture 4">
+                <a:extLst>
+                  <a:ext uri="{FF2B5EF4-FFF2-40B4-BE49-F238E27FC236}">
+                    <a16:creationId xmlns:a16="http://schemas.microsoft.com/office/drawing/2014/main" id="{4DCA734A-E185-E44C-B399-9F5F880C46BA}"/>
+                  </a:ext>
+                </a:extLst>
+              </p:cNvPr>
+              <p:cNvPicPr>
+                <a:picLocks noChangeAspect="1"/>
+              </p:cNvPicPr>
+              <p:nvPr/>
+            </p:nvPicPr>
+            <p:blipFill rotWithShape="1">
+              <a:blip r:embed="rId2"/>
+              <a:srcRect t="4557" b="3090"/>
+              <a:stretch/>
+            </p:blipFill>
+            <p:spPr>
+              <a:xfrm>
+                <a:off x="228604" y="84219"/>
+                <a:ext cx="8294913" cy="4468731"/>
+              </a:xfrm>
+              <a:prstGeom prst="rect">
+                <a:avLst/>
+              </a:prstGeom>
+            </p:spPr>
+          </p:pic>
+          <p:sp>
+            <p:nvSpPr>
+              <p:cNvPr id="6" name="Rectangle 5">
+                <a:extLst>
+                  <a:ext uri="{FF2B5EF4-FFF2-40B4-BE49-F238E27FC236}">
+                    <a16:creationId xmlns:a16="http://schemas.microsoft.com/office/drawing/2014/main" id="{44DB1070-7A64-C14E-8B96-7D0EADF4C3EE}"/>
+                  </a:ext>
+                </a:extLst>
+              </p:cNvPr>
+              <p:cNvSpPr/>
+              <p:nvPr/>
+            </p:nvSpPr>
+            <p:spPr>
+              <a:xfrm>
+                <a:off x="228602" y="84219"/>
+                <a:ext cx="1101009" cy="205030"/>
+              </a:xfrm>
+              <a:prstGeom prst="rect">
+                <a:avLst/>
+              </a:prstGeom>
+              <a:solidFill>
+                <a:schemeClr val="bg1"/>
+              </a:solidFill>
+              <a:ln>
+                <a:noFill/>
+              </a:ln>
+            </p:spPr>
+            <p:style>
+              <a:lnRef idx="2">
+                <a:schemeClr val="accent1">
+                  <a:shade val="50000"/>
+                </a:schemeClr>
+              </a:lnRef>
+              <a:fillRef idx="1">
+                <a:schemeClr val="accent1"/>
+              </a:fillRef>
+              <a:effectRef idx="0">
+                <a:schemeClr val="accent1"/>
+              </a:effectRef>
+              <a:fontRef idx="minor">
+                <a:schemeClr val="lt1"/>
+              </a:fontRef>
+            </p:style>
+            <p:txBody>
+              <a:bodyPr rot="0" spcFirstLastPara="0" vertOverflow="overflow" horzOverflow="overflow" vert="horz" wrap="square" lIns="91440" tIns="45720" rIns="91440" bIns="45720" numCol="1" spcCol="0" rtlCol="0" fromWordArt="0" anchor="ctr" anchorCtr="0" forceAA="0" compatLnSpc="1">
+                <a:prstTxWarp prst="textNoShape">
+                  <a:avLst/>
+                </a:prstTxWarp>
+                <a:noAutofit/>
+              </a:bodyPr>
+              <a:lstStyle/>
+              <a:p>
+                <a:pPr algn="ctr"/>
+                <a:endParaRPr lang="en-US"/>
+              </a:p>
+            </p:txBody>
+          </p:sp>
+          <p:sp>
+            <p:nvSpPr>
+              <p:cNvPr id="8" name="Rectangle 7">
+                <a:extLst>
+                  <a:ext uri="{FF2B5EF4-FFF2-40B4-BE49-F238E27FC236}">
+                    <a16:creationId xmlns:a16="http://schemas.microsoft.com/office/drawing/2014/main" id="{0B927CC1-0487-F645-890F-2496967FD5AD}"/>
+                  </a:ext>
+                </a:extLst>
+              </p:cNvPr>
+              <p:cNvSpPr/>
+              <p:nvPr/>
+            </p:nvSpPr>
+            <p:spPr>
+              <a:xfrm>
+                <a:off x="328407" y="3825437"/>
+                <a:ext cx="72150" cy="87062"/>
+              </a:xfrm>
+              <a:prstGeom prst="rect">
+                <a:avLst/>
+              </a:prstGeom>
+              <a:solidFill>
+                <a:schemeClr val="bg1"/>
+              </a:solidFill>
+              <a:ln>
+                <a:noFill/>
+              </a:ln>
+            </p:spPr>
+            <p:style>
+              <a:lnRef idx="2">
+                <a:schemeClr val="accent1">
+                  <a:shade val="50000"/>
+                </a:schemeClr>
+              </a:lnRef>
+              <a:fillRef idx="1">
+                <a:schemeClr val="accent1"/>
+              </a:fillRef>
+              <a:effectRef idx="0">
+                <a:schemeClr val="accent1"/>
+              </a:effectRef>
+              <a:fontRef idx="minor">
+                <a:schemeClr val="lt1"/>
+              </a:fontRef>
+            </p:style>
+            <p:txBody>
+              <a:bodyPr rot="0" spcFirstLastPara="0" vertOverflow="overflow" horzOverflow="overflow" vert="horz" wrap="square" lIns="91440" tIns="45720" rIns="91440" bIns="45720" numCol="1" spcCol="0" rtlCol="0" fromWordArt="0" anchor="ctr" anchorCtr="0" forceAA="0" compatLnSpc="1">
+                <a:prstTxWarp prst="textNoShape">
+                  <a:avLst/>
+                </a:prstTxWarp>
+                <a:noAutofit/>
+              </a:bodyPr>
+              <a:lstStyle/>
+              <a:p>
+                <a:pPr algn="ctr"/>
+                <a:endParaRPr lang="en-US"/>
+              </a:p>
+            </p:txBody>
+          </p:sp>
+          <p:sp>
+            <p:nvSpPr>
+              <p:cNvPr id="9" name="Rectangle 8">
+                <a:extLst>
+                  <a:ext uri="{FF2B5EF4-FFF2-40B4-BE49-F238E27FC236}">
+                    <a16:creationId xmlns:a16="http://schemas.microsoft.com/office/drawing/2014/main" id="{6BC5822C-AFBD-1D46-BE33-D93D7622A960}"/>
+                  </a:ext>
+                </a:extLst>
+              </p:cNvPr>
+              <p:cNvSpPr/>
+              <p:nvPr/>
+            </p:nvSpPr>
+            <p:spPr>
+              <a:xfrm>
+                <a:off x="1528557" y="4282637"/>
+                <a:ext cx="72150" cy="87062"/>
+              </a:xfrm>
+              <a:prstGeom prst="rect">
+                <a:avLst/>
+              </a:prstGeom>
+              <a:solidFill>
+                <a:schemeClr val="bg1"/>
+              </a:solidFill>
+              <a:ln>
+                <a:noFill/>
+              </a:ln>
+            </p:spPr>
+            <p:style>
+              <a:lnRef idx="2">
+                <a:schemeClr val="accent1">
+                  <a:shade val="50000"/>
+                </a:schemeClr>
+              </a:lnRef>
+              <a:fillRef idx="1">
+                <a:schemeClr val="accent1"/>
+              </a:fillRef>
+              <a:effectRef idx="0">
+                <a:schemeClr val="accent1"/>
+              </a:effectRef>
+              <a:fontRef idx="minor">
+                <a:schemeClr val="lt1"/>
+              </a:fontRef>
+            </p:style>
+            <p:txBody>
+              <a:bodyPr rot="0" spcFirstLastPara="0" vertOverflow="overflow" horzOverflow="overflow" vert="horz" wrap="square" lIns="91440" tIns="45720" rIns="91440" bIns="45720" numCol="1" spcCol="0" rtlCol="0" fromWordArt="0" anchor="ctr" anchorCtr="0" forceAA="0" compatLnSpc="1">
+                <a:prstTxWarp prst="textNoShape">
+                  <a:avLst/>
+                </a:prstTxWarp>
+                <a:noAutofit/>
+              </a:bodyPr>
+              <a:lstStyle/>
+              <a:p>
+                <a:pPr algn="ctr"/>
+                <a:endParaRPr lang="en-US"/>
+              </a:p>
+            </p:txBody>
+          </p:sp>
+          <p:sp>
+            <p:nvSpPr>
+              <p:cNvPr id="10" name="Rectangle 9">
+                <a:extLst>
+                  <a:ext uri="{FF2B5EF4-FFF2-40B4-BE49-F238E27FC236}">
+                    <a16:creationId xmlns:a16="http://schemas.microsoft.com/office/drawing/2014/main" id="{B17FFF7F-24D1-F940-B4F7-BBBEEE89659E}"/>
+                  </a:ext>
+                </a:extLst>
+              </p:cNvPr>
+              <p:cNvSpPr/>
+              <p:nvPr/>
+            </p:nvSpPr>
+            <p:spPr>
+              <a:xfrm>
+                <a:off x="6433932" y="2944625"/>
+                <a:ext cx="72150" cy="87062"/>
+              </a:xfrm>
+              <a:prstGeom prst="rect">
+                <a:avLst/>
+              </a:prstGeom>
+              <a:solidFill>
+                <a:schemeClr val="bg1"/>
+              </a:solidFill>
+              <a:ln>
+                <a:noFill/>
+              </a:ln>
+            </p:spPr>
+            <p:style>
+              <a:lnRef idx="2">
+                <a:schemeClr val="accent1">
+                  <a:shade val="50000"/>
+                </a:schemeClr>
+              </a:lnRef>
+              <a:fillRef idx="1">
+                <a:schemeClr val="accent1"/>
+              </a:fillRef>
+              <a:effectRef idx="0">
+                <a:schemeClr val="accent1"/>
+              </a:effectRef>
+              <a:fontRef idx="minor">
+                <a:schemeClr val="lt1"/>
+              </a:fontRef>
+            </p:style>
+            <p:txBody>
+              <a:bodyPr rot="0" spcFirstLastPara="0" vertOverflow="overflow" horzOverflow="overflow" vert="horz" wrap="square" lIns="91440" tIns="45720" rIns="91440" bIns="45720" numCol="1" spcCol="0" rtlCol="0" fromWordArt="0" anchor="ctr" anchorCtr="0" forceAA="0" compatLnSpc="1">
+                <a:prstTxWarp prst="textNoShape">
+                  <a:avLst/>
+                </a:prstTxWarp>
+                <a:noAutofit/>
+              </a:bodyPr>
+              <a:lstStyle/>
+              <a:p>
+                <a:pPr algn="ctr"/>
+                <a:endParaRPr lang="en-US"/>
+              </a:p>
+            </p:txBody>
+          </p:sp>
+          <p:sp>
+            <p:nvSpPr>
+              <p:cNvPr id="11" name="Rectangle 10">
+                <a:extLst>
+                  <a:ext uri="{FF2B5EF4-FFF2-40B4-BE49-F238E27FC236}">
+                    <a16:creationId xmlns:a16="http://schemas.microsoft.com/office/drawing/2014/main" id="{FC8E5959-F15A-264E-94EC-AAE7BE0357EC}"/>
+                  </a:ext>
+                </a:extLst>
+              </p:cNvPr>
+              <p:cNvSpPr/>
+              <p:nvPr/>
+            </p:nvSpPr>
+            <p:spPr>
+              <a:xfrm>
+                <a:off x="8402432" y="3627250"/>
+                <a:ext cx="72150" cy="87062"/>
+              </a:xfrm>
+              <a:prstGeom prst="rect">
+                <a:avLst/>
+              </a:prstGeom>
+              <a:solidFill>
+                <a:schemeClr val="bg1"/>
+              </a:solidFill>
+              <a:ln>
+                <a:noFill/>
+              </a:ln>
+            </p:spPr>
+            <p:style>
+              <a:lnRef idx="2">
+                <a:schemeClr val="accent1">
+                  <a:shade val="50000"/>
+                </a:schemeClr>
+              </a:lnRef>
+              <a:fillRef idx="1">
+                <a:schemeClr val="accent1"/>
+              </a:fillRef>
+              <a:effectRef idx="0">
+                <a:schemeClr val="accent1"/>
+              </a:effectRef>
+              <a:fontRef idx="minor">
+                <a:schemeClr val="lt1"/>
+              </a:fontRef>
+            </p:style>
+            <p:txBody>
+              <a:bodyPr rot="0" spcFirstLastPara="0" vertOverflow="overflow" horzOverflow="overflow" vert="horz" wrap="square" lIns="91440" tIns="45720" rIns="91440" bIns="45720" numCol="1" spcCol="0" rtlCol="0" fromWordArt="0" anchor="ctr" anchorCtr="0" forceAA="0" compatLnSpc="1">
+                <a:prstTxWarp prst="textNoShape">
+                  <a:avLst/>
+                </a:prstTxWarp>
+                <a:noAutofit/>
+              </a:bodyPr>
+              <a:lstStyle/>
+              <a:p>
+                <a:pPr algn="ctr"/>
+                <a:endParaRPr lang="en-US"/>
+              </a:p>
+            </p:txBody>
+          </p:sp>
+        </p:grpSp>
+        <p:sp>
+          <p:nvSpPr>
+            <p:cNvPr id="13" name="Rectangle 12">
+              <a:extLst>
+                <a:ext uri="{FF2B5EF4-FFF2-40B4-BE49-F238E27FC236}">
+                  <a16:creationId xmlns:a16="http://schemas.microsoft.com/office/drawing/2014/main" id="{A760DD98-C9BB-B745-9093-9D61548E67CA}"/>
+                </a:ext>
+              </a:extLst>
+            </p:cNvPr>
+            <p:cNvSpPr/>
+            <p:nvPr/>
+          </p:nvSpPr>
+          <p:spPr>
+            <a:xfrm>
+              <a:off x="383532" y="4497054"/>
+              <a:ext cx="3711272" cy="246221"/>
+            </a:xfrm>
+            <a:prstGeom prst="rect">
+              <a:avLst/>
+            </a:prstGeom>
+          </p:spPr>
+          <p:txBody>
+            <a:bodyPr wrap="none">
+              <a:spAutoFit/>
+            </a:bodyPr>
+            <a:lstStyle/>
+            <a:p>
+              <a:r>
+                <a:rPr lang="en-US" sz="1000" dirty="0">
+                  <a:solidFill>
+                    <a:prstClr val="black"/>
+                  </a:solidFill>
+                  <a:latin typeface="Arial" panose="020B0604020202020204" pitchFamily="34" charset="0"/>
+                  <a:cs typeface="Arial" panose="020B0604020202020204" pitchFamily="34" charset="0"/>
+                </a:rPr>
+                <a:t>1962       1971       1980        1989       1998       2007       2016</a:t>
+              </a:r>
+            </a:p>
+          </p:txBody>
+        </p:sp>
+        <p:sp>
+          <p:nvSpPr>
+            <p:cNvPr id="14" name="Rectangle 13">
+              <a:extLst>
+                <a:ext uri="{FF2B5EF4-FFF2-40B4-BE49-F238E27FC236}">
+                  <a16:creationId xmlns:a16="http://schemas.microsoft.com/office/drawing/2014/main" id="{A1FB1FCD-4D43-4D4B-94F8-B9A4174BE722}"/>
+                </a:ext>
+              </a:extLst>
+            </p:cNvPr>
+            <p:cNvSpPr/>
+            <p:nvPr/>
+          </p:nvSpPr>
+          <p:spPr>
+            <a:xfrm>
+              <a:off x="4763310" y="4525002"/>
+              <a:ext cx="3429144" cy="246221"/>
+            </a:xfrm>
+            <a:prstGeom prst="rect">
+              <a:avLst/>
+            </a:prstGeom>
+          </p:spPr>
+          <p:txBody>
+            <a:bodyPr wrap="none">
+              <a:spAutoFit/>
+            </a:bodyPr>
+            <a:lstStyle/>
+            <a:p>
+              <a:r>
+                <a:rPr lang="en-US" sz="1000" dirty="0">
+                  <a:solidFill>
+                    <a:prstClr val="black"/>
+                  </a:solidFill>
+                  <a:latin typeface="Arial" panose="020B0604020202020204" pitchFamily="34" charset="0"/>
+                  <a:cs typeface="Arial" panose="020B0604020202020204" pitchFamily="34" charset="0"/>
+                </a:rPr>
+                <a:t>2010             1980             1950             1920             1890</a:t>
+              </a:r>
+            </a:p>
+          </p:txBody>
+        </p:sp>
+      </p:grpSp>
+      <p:sp>
+        <p:nvSpPr>
+          <p:cNvPr id="16" name="Rectangle 15">
+            <a:extLst>
+              <a:ext uri="{FF2B5EF4-FFF2-40B4-BE49-F238E27FC236}">
+                <a16:creationId xmlns:a16="http://schemas.microsoft.com/office/drawing/2014/main" id="{8A0DB3B0-DC44-CC4D-9633-72F680354134}"/>
+              </a:ext>
+            </a:extLst>
+          </p:cNvPr>
+          <p:cNvSpPr/>
+          <p:nvPr/>
+        </p:nvSpPr>
+        <p:spPr>
+          <a:xfrm>
+            <a:off x="26214" y="9993"/>
+            <a:ext cx="389850" cy="461665"/>
+          </a:xfrm>
+          <a:prstGeom prst="rect">
+            <a:avLst/>
+          </a:prstGeom>
+        </p:spPr>
+        <p:txBody>
+          <a:bodyPr wrap="none">
+            <a:spAutoFit/>
+          </a:bodyPr>
+          <a:lstStyle/>
+          <a:p>
+            <a:r>
+              <a:rPr lang="en-US" sz="2400" dirty="0">
+                <a:solidFill>
+                  <a:prstClr val="black"/>
+                </a:solidFill>
+                <a:latin typeface="Arial" panose="020B0604020202020204" pitchFamily="34" charset="0"/>
+                <a:cs typeface="Arial" panose="020B0604020202020204" pitchFamily="34" charset="0"/>
+              </a:rPr>
+              <a:t>A</a:t>
+            </a:r>
+          </a:p>
+        </p:txBody>
+      </p:sp>
+      <p:grpSp>
+        <p:nvGrpSpPr>
+          <p:cNvPr id="21" name="Group 20">
+            <a:extLst>
+              <a:ext uri="{FF2B5EF4-FFF2-40B4-BE49-F238E27FC236}">
+                <a16:creationId xmlns:a16="http://schemas.microsoft.com/office/drawing/2014/main" id="{E39792D3-333D-FA42-9AEC-0AC6407ED906}"/>
+              </a:ext>
+            </a:extLst>
+          </p:cNvPr>
+          <p:cNvGrpSpPr/>
+          <p:nvPr/>
+        </p:nvGrpSpPr>
+        <p:grpSpPr>
+          <a:xfrm>
+            <a:off x="7534980" y="297125"/>
+            <a:ext cx="821059" cy="738664"/>
+            <a:chOff x="115752" y="461001"/>
+            <a:chExt cx="821059" cy="738664"/>
           </a:xfrm>
         </p:grpSpPr>
         <p:sp>
           <p:nvSpPr>
-            <p:cNvPr id="16" name="TextBox 15">
+            <p:cNvPr id="17" name="TextBox 16">
               <a:extLst>
                 <a:ext uri="{FF2B5EF4-FFF2-40B4-BE49-F238E27FC236}">
-                  <a16:creationId xmlns:a16="http://schemas.microsoft.com/office/drawing/2014/main" id="{7842E82F-8CB2-A74C-A305-3C249E78083B}"/>
+                  <a16:creationId xmlns:a16="http://schemas.microsoft.com/office/drawing/2014/main" id="{BE840D57-F44A-5E4D-A1AD-35C19D4F5458}"/>
                 </a:ext>
               </a:extLst>
             </p:cNvPr>
@@ -3248,8 +3476,8 @@
           </p:nvSpPr>
           <p:spPr>
             <a:xfrm>
-              <a:off x="5741217" y="3085741"/>
-              <a:ext cx="1030603" cy="646331"/>
+              <a:off x="115752" y="461001"/>
+              <a:ext cx="821059" cy="738664"/>
             </a:xfrm>
             <a:prstGeom prst="rect">
               <a:avLst/>
@@ -3257,9 +3485,9 @@
             <a:solidFill>
               <a:schemeClr val="bg1"/>
             </a:solidFill>
-            <a:ln w="15875" cap="rnd">
+            <a:ln>
               <a:solidFill>
-                <a:srgbClr val="D6D6D6"/>
+                <a:schemeClr val="tx1"/>
               </a:solidFill>
             </a:ln>
           </p:spPr>
@@ -3270,46 +3498,39 @@
             <a:lstStyle/>
             <a:p>
               <a:r>
-                <a:rPr lang="en-US" sz="1200" dirty="0">
+                <a:rPr lang="en-US" sz="1400" dirty="0">
                   <a:latin typeface="Arial" panose="020B0604020202020204" pitchFamily="34" charset="0"/>
                   <a:cs typeface="Arial" panose="020B0604020202020204" pitchFamily="34" charset="0"/>
                 </a:rPr>
-                <a:t>     </a:t>
-              </a:r>
-              <a:r>
-                <a:rPr lang="en-US" sz="1200" b="1" dirty="0">
-                  <a:latin typeface="Arial" panose="020B0604020202020204" pitchFamily="34" charset="0"/>
-                  <a:cs typeface="Arial" panose="020B0604020202020204" pitchFamily="34" charset="0"/>
-                </a:rPr>
-                <a:t>HKU1</a:t>
+                <a:t>Lineage</a:t>
               </a:r>
             </a:p>
             <a:p>
               <a:r>
-                <a:rPr lang="en-US" sz="1200" dirty="0">
+                <a:rPr lang="en-US" sz="1400" dirty="0">
                   <a:latin typeface="Arial" panose="020B0604020202020204" pitchFamily="34" charset="0"/>
                   <a:cs typeface="Arial" panose="020B0604020202020204" pitchFamily="34" charset="0"/>
                 </a:rPr>
-                <a:t>     lineage A</a:t>
+                <a:t>      A</a:t>
               </a:r>
             </a:p>
             <a:p>
               <a:r>
-                <a:rPr lang="en-US" sz="1200" dirty="0">
+                <a:rPr lang="en-US" sz="1400" dirty="0">
                   <a:latin typeface="Arial" panose="020B0604020202020204" pitchFamily="34" charset="0"/>
                   <a:cs typeface="Arial" panose="020B0604020202020204" pitchFamily="34" charset="0"/>
                 </a:rPr>
-                <a:t>     lineage B</a:t>
+                <a:t>      B</a:t>
               </a:r>
             </a:p>
           </p:txBody>
         </p:sp>
         <p:sp>
           <p:nvSpPr>
-            <p:cNvPr id="17" name="Oval 16">
+            <p:cNvPr id="19" name="Oval 18">
               <a:extLst>
                 <a:ext uri="{FF2B5EF4-FFF2-40B4-BE49-F238E27FC236}">
-                  <a16:creationId xmlns:a16="http://schemas.microsoft.com/office/drawing/2014/main" id="{1DEA79BA-2845-6F45-B693-21C6FC6D3FD0}"/>
+                  <a16:creationId xmlns:a16="http://schemas.microsoft.com/office/drawing/2014/main" id="{E8EE5000-C633-B249-850E-925147DA8031}"/>
                 </a:ext>
               </a:extLst>
             </p:cNvPr>
@@ -3318,14 +3539,182 @@
           </p:nvSpPr>
           <p:spPr>
             <a:xfrm>
-              <a:off x="5819812" y="3324178"/>
-              <a:ext cx="146304" cy="146304"/>
+              <a:off x="271648" y="746124"/>
+              <a:ext cx="142328" cy="142328"/>
             </a:xfrm>
             <a:prstGeom prst="ellipse">
               <a:avLst/>
             </a:prstGeom>
             <a:solidFill>
-              <a:srgbClr val="846198"/>
+              <a:srgbClr val="60B6F3"/>
+            </a:solidFill>
+            <a:ln>
+              <a:solidFill>
+                <a:srgbClr val="5796C3"/>
+              </a:solidFill>
+            </a:ln>
+          </p:spPr>
+          <p:style>
+            <a:lnRef idx="2">
+              <a:schemeClr val="accent1">
+                <a:shade val="50000"/>
+              </a:schemeClr>
+            </a:lnRef>
+            <a:fillRef idx="1">
+              <a:schemeClr val="accent1"/>
+            </a:fillRef>
+            <a:effectRef idx="0">
+              <a:schemeClr val="accent1"/>
+            </a:effectRef>
+            <a:fontRef idx="minor">
+              <a:schemeClr val="lt1"/>
+            </a:fontRef>
+          </p:style>
+          <p:txBody>
+            <a:bodyPr rot="0" spcFirstLastPara="0" vertOverflow="overflow" horzOverflow="overflow" vert="horz" wrap="square" lIns="91440" tIns="45720" rIns="91440" bIns="45720" numCol="1" spcCol="0" rtlCol="0" fromWordArt="0" anchor="ctr" anchorCtr="0" forceAA="0" compatLnSpc="1">
+              <a:prstTxWarp prst="textNoShape">
+                <a:avLst/>
+              </a:prstTxWarp>
+              <a:noAutofit/>
+            </a:bodyPr>
+            <a:lstStyle/>
+            <a:p>
+              <a:pPr algn="ctr"/>
+              <a:endParaRPr lang="en-US"/>
+            </a:p>
+          </p:txBody>
+        </p:sp>
+        <p:sp>
+          <p:nvSpPr>
+            <p:cNvPr id="20" name="Oval 19">
+              <a:extLst>
+                <a:ext uri="{FF2B5EF4-FFF2-40B4-BE49-F238E27FC236}">
+                  <a16:creationId xmlns:a16="http://schemas.microsoft.com/office/drawing/2014/main" id="{E4261405-0725-784B-B64F-86D4CCF25EEB}"/>
+                </a:ext>
+              </a:extLst>
+            </p:cNvPr>
+            <p:cNvSpPr/>
+            <p:nvPr/>
+          </p:nvSpPr>
+          <p:spPr>
+            <a:xfrm>
+              <a:off x="271648" y="964927"/>
+              <a:ext cx="142328" cy="142328"/>
+            </a:xfrm>
+            <a:prstGeom prst="ellipse">
+              <a:avLst/>
+            </a:prstGeom>
+            <a:solidFill>
+              <a:srgbClr val="FFE853"/>
+            </a:solidFill>
+            <a:ln>
+              <a:solidFill>
+                <a:srgbClr val="D9CA74"/>
+              </a:solidFill>
+            </a:ln>
+          </p:spPr>
+          <p:style>
+            <a:lnRef idx="2">
+              <a:schemeClr val="accent1">
+                <a:shade val="50000"/>
+              </a:schemeClr>
+            </a:lnRef>
+            <a:fillRef idx="1">
+              <a:schemeClr val="accent1"/>
+            </a:fillRef>
+            <a:effectRef idx="0">
+              <a:schemeClr val="accent1"/>
+            </a:effectRef>
+            <a:fontRef idx="minor">
+              <a:schemeClr val="lt1"/>
+            </a:fontRef>
+          </p:style>
+          <p:txBody>
+            <a:bodyPr rot="0" spcFirstLastPara="0" vertOverflow="overflow" horzOverflow="overflow" vert="horz" wrap="square" lIns="91440" tIns="45720" rIns="91440" bIns="45720" numCol="1" spcCol="0" rtlCol="0" fromWordArt="0" anchor="ctr" anchorCtr="0" forceAA="0" compatLnSpc="1">
+              <a:prstTxWarp prst="textNoShape">
+                <a:avLst/>
+              </a:prstTxWarp>
+              <a:noAutofit/>
+            </a:bodyPr>
+            <a:lstStyle/>
+            <a:p>
+              <a:pPr algn="ctr"/>
+              <a:endParaRPr lang="en-US"/>
+            </a:p>
+          </p:txBody>
+        </p:sp>
+      </p:grpSp>
+      <p:grpSp>
+        <p:nvGrpSpPr>
+          <p:cNvPr id="29" name="Group 28">
+            <a:extLst>
+              <a:ext uri="{FF2B5EF4-FFF2-40B4-BE49-F238E27FC236}">
+                <a16:creationId xmlns:a16="http://schemas.microsoft.com/office/drawing/2014/main" id="{7A692F95-FBF5-4242-9467-04B54CDBB3C5}"/>
+              </a:ext>
+            </a:extLst>
+          </p:cNvPr>
+          <p:cNvGrpSpPr/>
+          <p:nvPr/>
+        </p:nvGrpSpPr>
+        <p:grpSpPr>
+          <a:xfrm>
+            <a:off x="0" y="4922494"/>
+            <a:ext cx="8686800" cy="4694989"/>
+            <a:chOff x="0" y="4851553"/>
+            <a:chExt cx="8686800" cy="4694989"/>
+          </a:xfrm>
+        </p:grpSpPr>
+        <p:pic>
+          <p:nvPicPr>
+            <p:cNvPr id="23" name="Picture 22">
+              <a:extLst>
+                <a:ext uri="{FF2B5EF4-FFF2-40B4-BE49-F238E27FC236}">
+                  <a16:creationId xmlns:a16="http://schemas.microsoft.com/office/drawing/2014/main" id="{E09E6ACE-1BA6-B842-8BB6-D529D845A933}"/>
+                </a:ext>
+              </a:extLst>
+            </p:cNvPr>
+            <p:cNvPicPr>
+              <a:picLocks noChangeAspect="1"/>
+            </p:cNvPicPr>
+            <p:nvPr/>
+          </p:nvPicPr>
+          <p:blipFill rotWithShape="1">
+            <a:blip r:embed="rId3"/>
+            <a:srcRect t="4081" b="2637"/>
+            <a:stretch/>
+          </p:blipFill>
+          <p:spPr>
+            <a:xfrm>
+              <a:off x="0" y="4860345"/>
+              <a:ext cx="8686800" cy="4686197"/>
+            </a:xfrm>
+            <a:prstGeom prst="rect">
+              <a:avLst/>
+            </a:prstGeom>
+          </p:spPr>
+        </p:pic>
+        <p:sp>
+          <p:nvSpPr>
+            <p:cNvPr id="24" name="Rectangle 23">
+              <a:extLst>
+                <a:ext uri="{FF2B5EF4-FFF2-40B4-BE49-F238E27FC236}">
+                  <a16:creationId xmlns:a16="http://schemas.microsoft.com/office/drawing/2014/main" id="{684C52D4-5C08-304B-80A0-F283D2EB7A73}"/>
+                </a:ext>
+              </a:extLst>
+            </p:cNvPr>
+            <p:cNvSpPr/>
+            <p:nvPr/>
+          </p:nvSpPr>
+          <p:spPr>
+            <a:xfrm>
+              <a:off x="26214" y="4851553"/>
+              <a:ext cx="1125578" cy="221609"/>
+            </a:xfrm>
+            <a:prstGeom prst="rect">
+              <a:avLst/>
+            </a:prstGeom>
+            <a:solidFill>
+              <a:schemeClr val="bg1"/>
             </a:solidFill>
             <a:ln>
               <a:noFill/>
@@ -3363,10 +3752,10 @@
         </p:sp>
         <p:sp>
           <p:nvSpPr>
-            <p:cNvPr id="18" name="Oval 17">
+            <p:cNvPr id="25" name="Rectangle 24">
               <a:extLst>
                 <a:ext uri="{FF2B5EF4-FFF2-40B4-BE49-F238E27FC236}">
-                  <a16:creationId xmlns:a16="http://schemas.microsoft.com/office/drawing/2014/main" id="{FCF3DEC6-9355-E34F-819F-004F1C50322A}"/>
+                  <a16:creationId xmlns:a16="http://schemas.microsoft.com/office/drawing/2014/main" id="{E33D7486-D7ED-D14B-9DD3-081376C522FC}"/>
                 </a:ext>
               </a:extLst>
             </p:cNvPr>
@@ -3375,14 +3764,185 @@
           </p:nvSpPr>
           <p:spPr>
             <a:xfrm>
-              <a:off x="5819812" y="3515559"/>
-              <a:ext cx="146304" cy="146304"/>
+              <a:off x="1641475" y="8020050"/>
+              <a:ext cx="101426" cy="112591"/>
             </a:xfrm>
-            <a:prstGeom prst="ellipse">
+            <a:prstGeom prst="rect">
               <a:avLst/>
             </a:prstGeom>
             <a:solidFill>
-              <a:srgbClr val="B392C7"/>
+              <a:schemeClr val="bg1"/>
+            </a:solidFill>
+            <a:ln>
+              <a:noFill/>
+            </a:ln>
+          </p:spPr>
+          <p:style>
+            <a:lnRef idx="2">
+              <a:schemeClr val="accent1">
+                <a:shade val="50000"/>
+              </a:schemeClr>
+            </a:lnRef>
+            <a:fillRef idx="1">
+              <a:schemeClr val="accent1"/>
+            </a:fillRef>
+            <a:effectRef idx="0">
+              <a:schemeClr val="accent1"/>
+            </a:effectRef>
+            <a:fontRef idx="minor">
+              <a:schemeClr val="lt1"/>
+            </a:fontRef>
+          </p:style>
+          <p:txBody>
+            <a:bodyPr rot="0" spcFirstLastPara="0" vertOverflow="overflow" horzOverflow="overflow" vert="horz" wrap="square" lIns="91440" tIns="45720" rIns="91440" bIns="45720" numCol="1" spcCol="0" rtlCol="0" fromWordArt="0" anchor="ctr" anchorCtr="0" forceAA="0" compatLnSpc="1">
+              <a:prstTxWarp prst="textNoShape">
+                <a:avLst/>
+              </a:prstTxWarp>
+              <a:noAutofit/>
+            </a:bodyPr>
+            <a:lstStyle/>
+            <a:p>
+              <a:pPr algn="ctr"/>
+              <a:endParaRPr lang="en-US"/>
+            </a:p>
+          </p:txBody>
+        </p:sp>
+        <p:sp>
+          <p:nvSpPr>
+            <p:cNvPr id="26" name="Rectangle 25">
+              <a:extLst>
+                <a:ext uri="{FF2B5EF4-FFF2-40B4-BE49-F238E27FC236}">
+                  <a16:creationId xmlns:a16="http://schemas.microsoft.com/office/drawing/2014/main" id="{AFC432E5-683A-2540-A72F-CDC57CF82C7A}"/>
+                </a:ext>
+              </a:extLst>
+            </p:cNvPr>
+            <p:cNvSpPr/>
+            <p:nvPr/>
+          </p:nvSpPr>
+          <p:spPr>
+            <a:xfrm>
+              <a:off x="76200" y="8975725"/>
+              <a:ext cx="101426" cy="112591"/>
+            </a:xfrm>
+            <a:prstGeom prst="rect">
+              <a:avLst/>
+            </a:prstGeom>
+            <a:solidFill>
+              <a:schemeClr val="bg1"/>
+            </a:solidFill>
+            <a:ln>
+              <a:noFill/>
+            </a:ln>
+          </p:spPr>
+          <p:style>
+            <a:lnRef idx="2">
+              <a:schemeClr val="accent1">
+                <a:shade val="50000"/>
+              </a:schemeClr>
+            </a:lnRef>
+            <a:fillRef idx="1">
+              <a:schemeClr val="accent1"/>
+            </a:fillRef>
+            <a:effectRef idx="0">
+              <a:schemeClr val="accent1"/>
+            </a:effectRef>
+            <a:fontRef idx="minor">
+              <a:schemeClr val="lt1"/>
+            </a:fontRef>
+          </p:style>
+          <p:txBody>
+            <a:bodyPr rot="0" spcFirstLastPara="0" vertOverflow="overflow" horzOverflow="overflow" vert="horz" wrap="square" lIns="91440" tIns="45720" rIns="91440" bIns="45720" numCol="1" spcCol="0" rtlCol="0" fromWordArt="0" anchor="ctr" anchorCtr="0" forceAA="0" compatLnSpc="1">
+              <a:prstTxWarp prst="textNoShape">
+                <a:avLst/>
+              </a:prstTxWarp>
+              <a:noAutofit/>
+            </a:bodyPr>
+            <a:lstStyle/>
+            <a:p>
+              <a:pPr algn="ctr"/>
+              <a:endParaRPr lang="en-US"/>
+            </a:p>
+          </p:txBody>
+        </p:sp>
+        <p:sp>
+          <p:nvSpPr>
+            <p:cNvPr id="27" name="Rectangle 26">
+              <a:extLst>
+                <a:ext uri="{FF2B5EF4-FFF2-40B4-BE49-F238E27FC236}">
+                  <a16:creationId xmlns:a16="http://schemas.microsoft.com/office/drawing/2014/main" id="{D1388CAC-2250-674C-87CF-EFD15B09F460}"/>
+                </a:ext>
+              </a:extLst>
+            </p:cNvPr>
+            <p:cNvSpPr/>
+            <p:nvPr/>
+          </p:nvSpPr>
+          <p:spPr>
+            <a:xfrm>
+              <a:off x="7654263" y="9304216"/>
+              <a:ext cx="101426" cy="112591"/>
+            </a:xfrm>
+            <a:prstGeom prst="rect">
+              <a:avLst/>
+            </a:prstGeom>
+            <a:solidFill>
+              <a:schemeClr val="bg1"/>
+            </a:solidFill>
+            <a:ln>
+              <a:noFill/>
+            </a:ln>
+          </p:spPr>
+          <p:style>
+            <a:lnRef idx="2">
+              <a:schemeClr val="accent1">
+                <a:shade val="50000"/>
+              </a:schemeClr>
+            </a:lnRef>
+            <a:fillRef idx="1">
+              <a:schemeClr val="accent1"/>
+            </a:fillRef>
+            <a:effectRef idx="0">
+              <a:schemeClr val="accent1"/>
+            </a:effectRef>
+            <a:fontRef idx="minor">
+              <a:schemeClr val="lt1"/>
+            </a:fontRef>
+          </p:style>
+          <p:txBody>
+            <a:bodyPr rot="0" spcFirstLastPara="0" vertOverflow="overflow" horzOverflow="overflow" vert="horz" wrap="square" lIns="91440" tIns="45720" rIns="91440" bIns="45720" numCol="1" spcCol="0" rtlCol="0" fromWordArt="0" anchor="ctr" anchorCtr="0" forceAA="0" compatLnSpc="1">
+              <a:prstTxWarp prst="textNoShape">
+                <a:avLst/>
+              </a:prstTxWarp>
+              <a:noAutofit/>
+            </a:bodyPr>
+            <a:lstStyle/>
+            <a:p>
+              <a:pPr algn="ctr"/>
+              <a:endParaRPr lang="en-US"/>
+            </a:p>
+          </p:txBody>
+        </p:sp>
+        <p:sp>
+          <p:nvSpPr>
+            <p:cNvPr id="28" name="Rectangle 27">
+              <a:extLst>
+                <a:ext uri="{FF2B5EF4-FFF2-40B4-BE49-F238E27FC236}">
+                  <a16:creationId xmlns:a16="http://schemas.microsoft.com/office/drawing/2014/main" id="{AC8F689A-AEB2-AF4E-B56A-E6444C3A067C}"/>
+                </a:ext>
+              </a:extLst>
+            </p:cNvPr>
+            <p:cNvSpPr/>
+            <p:nvPr/>
+          </p:nvSpPr>
+          <p:spPr>
+            <a:xfrm>
+              <a:off x="8567278" y="8586666"/>
+              <a:ext cx="101426" cy="112591"/>
+            </a:xfrm>
+            <a:prstGeom prst="rect">
+              <a:avLst/>
+            </a:prstGeom>
+            <a:solidFill>
+              <a:schemeClr val="bg1"/>
             </a:solidFill>
             <a:ln>
               <a:noFill/>
@@ -3419,270 +3979,302 @@
           </p:txBody>
         </p:sp>
       </p:grpSp>
-      <p:grpSp>
-        <p:nvGrpSpPr>
-          <p:cNvPr id="26" name="Group 25">
+      <p:sp>
+        <p:nvSpPr>
+          <p:cNvPr id="30" name="Rectangle 29">
             <a:extLst>
               <a:ext uri="{FF2B5EF4-FFF2-40B4-BE49-F238E27FC236}">
-                <a16:creationId xmlns:a16="http://schemas.microsoft.com/office/drawing/2014/main" id="{0351EA7D-675C-6843-BB93-D6720F1257A9}"/>
+                <a16:creationId xmlns:a16="http://schemas.microsoft.com/office/drawing/2014/main" id="{0B2DF39B-0D1A-1443-8058-DDE2BEB6F53D}"/>
               </a:ext>
             </a:extLst>
           </p:cNvPr>
-          <p:cNvGrpSpPr/>
+          <p:cNvSpPr/>
           <p:nvPr/>
-        </p:nvGrpSpPr>
-        <p:grpSpPr>
+        </p:nvSpPr>
+        <p:spPr>
           <a:xfrm>
-            <a:off x="5934236" y="3192186"/>
-            <a:ext cx="817853" cy="276999"/>
-            <a:chOff x="5966116" y="5937023"/>
-            <a:chExt cx="817853" cy="276999"/>
+            <a:off x="76201" y="9709865"/>
+            <a:ext cx="3958135" cy="246221"/>
           </a:xfrm>
-        </p:grpSpPr>
-        <p:sp>
-          <p:nvSpPr>
-            <p:cNvPr id="20" name="TextBox 19">
-              <a:extLst>
-                <a:ext uri="{FF2B5EF4-FFF2-40B4-BE49-F238E27FC236}">
-                  <a16:creationId xmlns:a16="http://schemas.microsoft.com/office/drawing/2014/main" id="{8F55332D-58C7-304D-BF13-5B985F106199}"/>
-                </a:ext>
-              </a:extLst>
-            </p:cNvPr>
-            <p:cNvSpPr txBox="1"/>
-            <p:nvPr/>
-          </p:nvSpPr>
-          <p:spPr>
-            <a:xfrm>
-              <a:off x="5966116" y="5937023"/>
-              <a:ext cx="817853" cy="276999"/>
-            </a:xfrm>
-            <a:prstGeom prst="rect">
-              <a:avLst/>
-            </a:prstGeom>
-            <a:solidFill>
-              <a:schemeClr val="bg1"/>
-            </a:solidFill>
-            <a:ln w="15875" cap="rnd">
-              <a:solidFill>
-                <a:srgbClr val="D6D6D6"/>
-              </a:solidFill>
-            </a:ln>
-          </p:spPr>
-          <p:txBody>
-            <a:bodyPr wrap="none" rtlCol="0">
-              <a:spAutoFit/>
-            </a:bodyPr>
-            <a:lstStyle/>
-            <a:p>
-              <a:r>
-                <a:rPr lang="en-US" sz="1200" dirty="0">
-                  <a:latin typeface="Arial" panose="020B0604020202020204" pitchFamily="34" charset="0"/>
-                  <a:cs typeface="Arial" panose="020B0604020202020204" pitchFamily="34" charset="0"/>
-                </a:rPr>
-                <a:t>     </a:t>
-              </a:r>
-              <a:r>
-                <a:rPr lang="en-US" sz="1200" b="1" dirty="0">
-                  <a:latin typeface="Arial" panose="020B0604020202020204" pitchFamily="34" charset="0"/>
-                  <a:cs typeface="Arial" panose="020B0604020202020204" pitchFamily="34" charset="0"/>
-                </a:rPr>
-                <a:t>HKU1</a:t>
-              </a:r>
-            </a:p>
-          </p:txBody>
-        </p:sp>
-        <p:sp>
-          <p:nvSpPr>
-            <p:cNvPr id="21" name="Oval 20">
-              <a:extLst>
-                <a:ext uri="{FF2B5EF4-FFF2-40B4-BE49-F238E27FC236}">
-                  <a16:creationId xmlns:a16="http://schemas.microsoft.com/office/drawing/2014/main" id="{914F21F7-A286-CF41-86E1-E9E31E8E4B9E}"/>
-                </a:ext>
-              </a:extLst>
-            </p:cNvPr>
-            <p:cNvSpPr/>
-            <p:nvPr/>
-          </p:nvSpPr>
-          <p:spPr>
-            <a:xfrm>
-              <a:off x="6044711" y="6003184"/>
-              <a:ext cx="146304" cy="146304"/>
-            </a:xfrm>
-            <a:prstGeom prst="ellipse">
-              <a:avLst/>
-            </a:prstGeom>
-            <a:solidFill>
-              <a:srgbClr val="B392C7"/>
-            </a:solidFill>
-            <a:ln>
-              <a:noFill/>
-            </a:ln>
-          </p:spPr>
-          <p:style>
-            <a:lnRef idx="2">
-              <a:schemeClr val="accent1">
-                <a:shade val="50000"/>
-              </a:schemeClr>
-            </a:lnRef>
-            <a:fillRef idx="1">
-              <a:schemeClr val="accent1"/>
-            </a:fillRef>
-            <a:effectRef idx="0">
-              <a:schemeClr val="accent1"/>
-            </a:effectRef>
-            <a:fontRef idx="minor">
-              <a:schemeClr val="lt1"/>
-            </a:fontRef>
-          </p:style>
-          <p:txBody>
-            <a:bodyPr rot="0" spcFirstLastPara="0" vertOverflow="overflow" horzOverflow="overflow" vert="horz" wrap="square" lIns="91440" tIns="45720" rIns="91440" bIns="45720" numCol="1" spcCol="0" rtlCol="0" fromWordArt="0" anchor="ctr" anchorCtr="0" forceAA="0" compatLnSpc="1">
-              <a:prstTxWarp prst="textNoShape">
-                <a:avLst/>
-              </a:prstTxWarp>
-              <a:noAutofit/>
-            </a:bodyPr>
-            <a:lstStyle/>
-            <a:p>
-              <a:pPr algn="ctr"/>
-              <a:endParaRPr lang="en-US"/>
-            </a:p>
-          </p:txBody>
-        </p:sp>
-      </p:grpSp>
-      <p:grpSp>
-        <p:nvGrpSpPr>
-          <p:cNvPr id="25" name="Group 24">
+          <a:prstGeom prst="rect">
+            <a:avLst/>
+          </a:prstGeom>
+        </p:spPr>
+        <p:txBody>
+          <a:bodyPr wrap="none">
+            <a:spAutoFit/>
+          </a:bodyPr>
+          <a:lstStyle/>
+          <a:p>
+            <a:r>
+              <a:rPr lang="en-US" sz="1000" dirty="0">
+                <a:solidFill>
+                  <a:prstClr val="black"/>
+                </a:solidFill>
+                <a:latin typeface="Arial" panose="020B0604020202020204" pitchFamily="34" charset="0"/>
+                <a:cs typeface="Arial" panose="020B0604020202020204" pitchFamily="34" charset="0"/>
+              </a:rPr>
+              <a:t>1968        1976        1984         1992         2000         2008        2016</a:t>
+            </a:r>
+          </a:p>
+        </p:txBody>
+      </p:sp>
+      <p:sp>
+        <p:nvSpPr>
+          <p:cNvPr id="31" name="Rectangle 30">
             <a:extLst>
               <a:ext uri="{FF2B5EF4-FFF2-40B4-BE49-F238E27FC236}">
-                <a16:creationId xmlns:a16="http://schemas.microsoft.com/office/drawing/2014/main" id="{49A3F309-B3C3-D649-85E9-5D5DEC3EBDE9}"/>
+                <a16:creationId xmlns:a16="http://schemas.microsoft.com/office/drawing/2014/main" id="{29F9370F-7905-434A-B534-2C0826CE24EA}"/>
               </a:ext>
             </a:extLst>
           </p:cNvPr>
-          <p:cNvGrpSpPr/>
+          <p:cNvSpPr/>
           <p:nvPr/>
-        </p:nvGrpSpPr>
-        <p:grpSpPr>
+        </p:nvSpPr>
+        <p:spPr>
           <a:xfrm>
-            <a:off x="5957386" y="438097"/>
-            <a:ext cx="776175" cy="276999"/>
-            <a:chOff x="6006949" y="629333"/>
-            <a:chExt cx="776175" cy="276999"/>
+            <a:off x="4763311" y="9709864"/>
+            <a:ext cx="3887603" cy="246221"/>
           </a:xfrm>
-        </p:grpSpPr>
-        <p:sp>
-          <p:nvSpPr>
-            <p:cNvPr id="23" name="TextBox 22">
-              <a:extLst>
-                <a:ext uri="{FF2B5EF4-FFF2-40B4-BE49-F238E27FC236}">
-                  <a16:creationId xmlns:a16="http://schemas.microsoft.com/office/drawing/2014/main" id="{CE2E069B-7ECA-4544-AE7D-D5E73048DEDE}"/>
-                </a:ext>
-              </a:extLst>
-            </p:cNvPr>
-            <p:cNvSpPr txBox="1"/>
-            <p:nvPr/>
-          </p:nvSpPr>
-          <p:spPr>
-            <a:xfrm>
-              <a:off x="6006949" y="629333"/>
-              <a:ext cx="776175" cy="276999"/>
-            </a:xfrm>
-            <a:prstGeom prst="rect">
-              <a:avLst/>
-            </a:prstGeom>
-            <a:solidFill>
-              <a:schemeClr val="bg1"/>
-            </a:solidFill>
-            <a:ln w="15875" cap="rnd">
-              <a:solidFill>
-                <a:srgbClr val="D6D6D6"/>
-              </a:solidFill>
-            </a:ln>
-          </p:spPr>
-          <p:txBody>
-            <a:bodyPr wrap="none" rtlCol="0">
-              <a:spAutoFit/>
-            </a:bodyPr>
-            <a:lstStyle/>
-            <a:p>
-              <a:r>
-                <a:rPr lang="en-US" sz="1200" dirty="0">
-                  <a:latin typeface="Arial" panose="020B0604020202020204" pitchFamily="34" charset="0"/>
-                  <a:cs typeface="Arial" panose="020B0604020202020204" pitchFamily="34" charset="0"/>
-                </a:rPr>
-                <a:t>     </a:t>
-              </a:r>
-              <a:r>
-                <a:rPr lang="en-US" sz="1200" b="1" dirty="0">
-                  <a:latin typeface="Arial" panose="020B0604020202020204" pitchFamily="34" charset="0"/>
-                  <a:cs typeface="Arial" panose="020B0604020202020204" pitchFamily="34" charset="0"/>
-                </a:rPr>
-                <a:t>NL63</a:t>
-              </a:r>
-            </a:p>
-          </p:txBody>
-        </p:sp>
-        <p:sp>
-          <p:nvSpPr>
-            <p:cNvPr id="24" name="Oval 23">
-              <a:extLst>
-                <a:ext uri="{FF2B5EF4-FFF2-40B4-BE49-F238E27FC236}">
-                  <a16:creationId xmlns:a16="http://schemas.microsoft.com/office/drawing/2014/main" id="{A64CD4F4-02F3-4643-AB11-6252A0616BF9}"/>
-                </a:ext>
-              </a:extLst>
-            </p:cNvPr>
-            <p:cNvSpPr/>
-            <p:nvPr/>
-          </p:nvSpPr>
-          <p:spPr>
-            <a:xfrm>
-              <a:off x="6085544" y="695494"/>
-              <a:ext cx="146304" cy="146304"/>
-            </a:xfrm>
-            <a:prstGeom prst="ellipse">
-              <a:avLst/>
-            </a:prstGeom>
-            <a:solidFill>
-              <a:srgbClr val="209A8D"/>
-            </a:solidFill>
-            <a:ln>
-              <a:noFill/>
-            </a:ln>
-          </p:spPr>
-          <p:style>
-            <a:lnRef idx="2">
-              <a:schemeClr val="accent1">
-                <a:shade val="50000"/>
-              </a:schemeClr>
-            </a:lnRef>
-            <a:fillRef idx="1">
-              <a:schemeClr val="accent1"/>
-            </a:fillRef>
-            <a:effectRef idx="0">
-              <a:schemeClr val="accent1"/>
-            </a:effectRef>
-            <a:fontRef idx="minor">
-              <a:schemeClr val="lt1"/>
-            </a:fontRef>
-          </p:style>
-          <p:txBody>
-            <a:bodyPr rot="0" spcFirstLastPara="0" vertOverflow="overflow" horzOverflow="overflow" vert="horz" wrap="square" lIns="91440" tIns="45720" rIns="91440" bIns="45720" numCol="1" spcCol="0" rtlCol="0" fromWordArt="0" anchor="ctr" anchorCtr="0" forceAA="0" compatLnSpc="1">
-              <a:prstTxWarp prst="textNoShape">
-                <a:avLst/>
-              </a:prstTxWarp>
-              <a:noAutofit/>
-            </a:bodyPr>
-            <a:lstStyle/>
-            <a:p>
-              <a:pPr algn="ctr"/>
-              <a:endParaRPr lang="en-US"/>
-            </a:p>
-          </p:txBody>
-        </p:sp>
-      </p:grpSp>
+          <a:prstGeom prst="rect">
+            <a:avLst/>
+          </a:prstGeom>
+        </p:spPr>
+        <p:txBody>
+          <a:bodyPr wrap="none">
+            <a:spAutoFit/>
+          </a:bodyPr>
+          <a:lstStyle/>
+          <a:p>
+            <a:r>
+              <a:rPr lang="en-US" sz="1000" dirty="0">
+                <a:solidFill>
+                  <a:prstClr val="black"/>
+                </a:solidFill>
+                <a:latin typeface="Arial" panose="020B0604020202020204" pitchFamily="34" charset="0"/>
+                <a:cs typeface="Arial" panose="020B0604020202020204" pitchFamily="34" charset="0"/>
+              </a:rPr>
+              <a:t>2016        2007        1998        1989        1980        1971       1962</a:t>
+            </a:r>
+          </a:p>
+        </p:txBody>
+      </p:sp>
+      <p:sp>
+        <p:nvSpPr>
+          <p:cNvPr id="32" name="Rectangle 31">
+            <a:extLst>
+              <a:ext uri="{FF2B5EF4-FFF2-40B4-BE49-F238E27FC236}">
+                <a16:creationId xmlns:a16="http://schemas.microsoft.com/office/drawing/2014/main" id="{5EE2760F-44CA-4445-882E-91ED3C53F6F1}"/>
+              </a:ext>
+            </a:extLst>
+          </p:cNvPr>
+          <p:cNvSpPr/>
+          <p:nvPr/>
+        </p:nvSpPr>
+        <p:spPr>
+          <a:xfrm>
+            <a:off x="21100" y="4700270"/>
+            <a:ext cx="389850" cy="461665"/>
+          </a:xfrm>
+          <a:prstGeom prst="rect">
+            <a:avLst/>
+          </a:prstGeom>
+        </p:spPr>
+        <p:txBody>
+          <a:bodyPr wrap="none">
+            <a:spAutoFit/>
+          </a:bodyPr>
+          <a:lstStyle/>
+          <a:p>
+            <a:r>
+              <a:rPr lang="en-US" sz="2400" dirty="0">
+                <a:solidFill>
+                  <a:prstClr val="black"/>
+                </a:solidFill>
+                <a:latin typeface="Arial" panose="020B0604020202020204" pitchFamily="34" charset="0"/>
+                <a:cs typeface="Arial" panose="020B0604020202020204" pitchFamily="34" charset="0"/>
+              </a:rPr>
+              <a:t>B</a:t>
+            </a:r>
+          </a:p>
+        </p:txBody>
+      </p:sp>
+      <p:sp>
+        <p:nvSpPr>
+          <p:cNvPr id="33" name="Rectangle 32">
+            <a:extLst>
+              <a:ext uri="{FF2B5EF4-FFF2-40B4-BE49-F238E27FC236}">
+                <a16:creationId xmlns:a16="http://schemas.microsoft.com/office/drawing/2014/main" id="{55158EB5-9151-6940-AF49-4A14543DC54C}"/>
+              </a:ext>
+            </a:extLst>
+          </p:cNvPr>
+          <p:cNvSpPr/>
+          <p:nvPr/>
+        </p:nvSpPr>
+        <p:spPr>
+          <a:xfrm>
+            <a:off x="2581806" y="4982167"/>
+            <a:ext cx="922047" cy="307777"/>
+          </a:xfrm>
+          <a:prstGeom prst="rect">
+            <a:avLst/>
+          </a:prstGeom>
+          <a:solidFill>
+            <a:schemeClr val="bg1"/>
+          </a:solidFill>
+        </p:spPr>
+        <p:txBody>
+          <a:bodyPr wrap="none">
+            <a:spAutoFit/>
+          </a:bodyPr>
+          <a:lstStyle/>
+          <a:p>
+            <a:r>
+              <a:rPr lang="en-US" sz="1400" dirty="0">
+                <a:solidFill>
+                  <a:prstClr val="black"/>
+                </a:solidFill>
+                <a:latin typeface="Arial" panose="020B0604020202020204" pitchFamily="34" charset="0"/>
+                <a:cs typeface="Arial" panose="020B0604020202020204" pitchFamily="34" charset="0"/>
+              </a:rPr>
+              <a:t>OC43 S1</a:t>
+            </a:r>
+          </a:p>
+        </p:txBody>
+      </p:sp>
+      <p:sp>
+        <p:nvSpPr>
+          <p:cNvPr id="34" name="Rectangle 33">
+            <a:extLst>
+              <a:ext uri="{FF2B5EF4-FFF2-40B4-BE49-F238E27FC236}">
+                <a16:creationId xmlns:a16="http://schemas.microsoft.com/office/drawing/2014/main" id="{EB7F5713-360A-F645-BBFC-4A442B2A9FB4}"/>
+              </a:ext>
+            </a:extLst>
+          </p:cNvPr>
+          <p:cNvSpPr/>
+          <p:nvPr/>
+        </p:nvSpPr>
+        <p:spPr>
+          <a:xfrm>
+            <a:off x="5511886" y="4959234"/>
+            <a:ext cx="922047" cy="307777"/>
+          </a:xfrm>
+          <a:prstGeom prst="rect">
+            <a:avLst/>
+          </a:prstGeom>
+          <a:solidFill>
+            <a:schemeClr val="bg1"/>
+          </a:solidFill>
+        </p:spPr>
+        <p:txBody>
+          <a:bodyPr wrap="none">
+            <a:spAutoFit/>
+          </a:bodyPr>
+          <a:lstStyle/>
+          <a:p>
+            <a:r>
+              <a:rPr lang="en-US" sz="1400" dirty="0">
+                <a:solidFill>
+                  <a:prstClr val="black"/>
+                </a:solidFill>
+                <a:latin typeface="Arial" panose="020B0604020202020204" pitchFamily="34" charset="0"/>
+                <a:cs typeface="Arial" panose="020B0604020202020204" pitchFamily="34" charset="0"/>
+              </a:rPr>
+              <a:t>OC43 S2</a:t>
+            </a:r>
+          </a:p>
+        </p:txBody>
+      </p:sp>
+      <p:sp>
+        <p:nvSpPr>
+          <p:cNvPr id="35" name="Rectangle 34">
+            <a:extLst>
+              <a:ext uri="{FF2B5EF4-FFF2-40B4-BE49-F238E27FC236}">
+                <a16:creationId xmlns:a16="http://schemas.microsoft.com/office/drawing/2014/main" id="{97E71BF6-9A27-8344-B2A6-5DAEB3917A8F}"/>
+              </a:ext>
+            </a:extLst>
+          </p:cNvPr>
+          <p:cNvSpPr/>
+          <p:nvPr/>
+        </p:nvSpPr>
+        <p:spPr>
+          <a:xfrm>
+            <a:off x="5050862" y="161699"/>
+            <a:ext cx="1151277" cy="307777"/>
+          </a:xfrm>
+          <a:prstGeom prst="rect">
+            <a:avLst/>
+          </a:prstGeom>
+          <a:solidFill>
+            <a:schemeClr val="bg1"/>
+          </a:solidFill>
+        </p:spPr>
+        <p:txBody>
+          <a:bodyPr wrap="none">
+            <a:spAutoFit/>
+          </a:bodyPr>
+          <a:lstStyle/>
+          <a:p>
+            <a:r>
+              <a:rPr lang="en-US" sz="1400" dirty="0">
+                <a:solidFill>
+                  <a:prstClr val="black"/>
+                </a:solidFill>
+                <a:latin typeface="Arial" panose="020B0604020202020204" pitchFamily="34" charset="0"/>
+                <a:cs typeface="Arial" panose="020B0604020202020204" pitchFamily="34" charset="0"/>
+              </a:rPr>
+              <a:t>OC43 Spike</a:t>
+            </a:r>
+          </a:p>
+        </p:txBody>
+      </p:sp>
+      <p:sp>
+        <p:nvSpPr>
+          <p:cNvPr id="36" name="Rectangle 35">
+            <a:extLst>
+              <a:ext uri="{FF2B5EF4-FFF2-40B4-BE49-F238E27FC236}">
+                <a16:creationId xmlns:a16="http://schemas.microsoft.com/office/drawing/2014/main" id="{D04EA4DE-2024-254D-A20F-D38F0AAFD3A1}"/>
+              </a:ext>
+            </a:extLst>
+          </p:cNvPr>
+          <p:cNvSpPr/>
+          <p:nvPr/>
+        </p:nvSpPr>
+        <p:spPr>
+          <a:xfrm>
+            <a:off x="2377957" y="161698"/>
+            <a:ext cx="1160895" cy="307777"/>
+          </a:xfrm>
+          <a:prstGeom prst="rect">
+            <a:avLst/>
+          </a:prstGeom>
+          <a:solidFill>
+            <a:schemeClr val="bg1"/>
+          </a:solidFill>
+        </p:spPr>
+        <p:txBody>
+          <a:bodyPr wrap="none">
+            <a:spAutoFit/>
+          </a:bodyPr>
+          <a:lstStyle/>
+          <a:p>
+            <a:r>
+              <a:rPr lang="en-US" sz="1400" dirty="0">
+                <a:solidFill>
+                  <a:prstClr val="black"/>
+                </a:solidFill>
+                <a:latin typeface="Arial" panose="020B0604020202020204" pitchFamily="34" charset="0"/>
+                <a:cs typeface="Arial" panose="020B0604020202020204" pitchFamily="34" charset="0"/>
+              </a:rPr>
+              <a:t>OC43 RdRp</a:t>
+            </a:r>
+          </a:p>
+        </p:txBody>
+      </p:sp>
     </p:spTree>
     <p:extLst>
       <p:ext uri="{BB962C8B-B14F-4D97-AF65-F5344CB8AC3E}">
-        <p14:creationId xmlns:p14="http://schemas.microsoft.com/office/powerpoint/2010/main" val="162007888"/>
+        <p14:creationId xmlns:p14="http://schemas.microsoft.com/office/powerpoint/2010/main" val="3627107423"/>
       </p:ext>
     </p:extLst>
   </p:cSld>

</xml_diff>